<commit_message>
Update ppt file to version 0.2
</commit_message>
<xml_diff>
--- a/Spring.pptx
+++ b/Spring.pptx
@@ -2,7 +2,7 @@
 <file path=ppt/presentation.xml><?xml version="1.0" encoding="utf-8"?>
 <p:presentation xmlns:a="http://schemas.openxmlformats.org/drawingml/2006/main" xmlns:r="http://schemas.openxmlformats.org/officeDocument/2006/relationships" xmlns:p="http://schemas.openxmlformats.org/presentationml/2006/main" saveSubsetFonts="1">
   <p:sldMasterIdLst>
-    <p:sldMasterId id="2147483768" r:id="rId1"/>
+    <p:sldMasterId id="2147483792" r:id="rId1"/>
   </p:sldMasterIdLst>
   <p:sldIdLst>
     <p:sldId id="256" r:id="rId2"/>
@@ -20,6 +20,7 @@
     <p:sldId id="270" r:id="rId14"/>
     <p:sldId id="269" r:id="rId15"/>
     <p:sldId id="264" r:id="rId16"/>
+    <p:sldId id="271" r:id="rId17"/>
   </p:sldIdLst>
   <p:sldSz cx="9144000" cy="6858000" type="screen4x3"/>
   <p:notesSz cx="6858000" cy="9144000"/>
@@ -4307,17 +4308,17 @@
   </p:cSld>
   <p:clrMap bg1="lt1" tx1="dk1" bg2="lt2" tx2="dk2" accent1="accent1" accent2="accent2" accent3="accent3" accent4="accent4" accent5="accent5" accent6="accent6" hlink="hlink" folHlink="folHlink"/>
   <p:sldLayoutIdLst>
-    <p:sldLayoutId id="2147483769" r:id="rId1"/>
-    <p:sldLayoutId id="2147483770" r:id="rId2"/>
-    <p:sldLayoutId id="2147483771" r:id="rId3"/>
-    <p:sldLayoutId id="2147483772" r:id="rId4"/>
-    <p:sldLayoutId id="2147483773" r:id="rId5"/>
-    <p:sldLayoutId id="2147483774" r:id="rId6"/>
-    <p:sldLayoutId id="2147483775" r:id="rId7"/>
-    <p:sldLayoutId id="2147483776" r:id="rId8"/>
-    <p:sldLayoutId id="2147483777" r:id="rId9"/>
-    <p:sldLayoutId id="2147483778" r:id="rId10"/>
-    <p:sldLayoutId id="2147483779" r:id="rId11"/>
+    <p:sldLayoutId id="2147483793" r:id="rId1"/>
+    <p:sldLayoutId id="2147483794" r:id="rId2"/>
+    <p:sldLayoutId id="2147483795" r:id="rId3"/>
+    <p:sldLayoutId id="2147483796" r:id="rId4"/>
+    <p:sldLayoutId id="2147483797" r:id="rId5"/>
+    <p:sldLayoutId id="2147483798" r:id="rId6"/>
+    <p:sldLayoutId id="2147483799" r:id="rId7"/>
+    <p:sldLayoutId id="2147483800" r:id="rId8"/>
+    <p:sldLayoutId id="2147483801" r:id="rId9"/>
+    <p:sldLayoutId id="2147483802" r:id="rId10"/>
+    <p:sldLayoutId id="2147483803" r:id="rId11"/>
   </p:sldLayoutIdLst>
   <p:txStyles>
     <p:titleStyle>
@@ -4711,52 +4712,6 @@
           <a:chExt cx="0" cy="0"/>
         </a:xfrm>
       </p:grpSpPr>
-      <p:sp>
-        <p:nvSpPr>
-          <p:cNvPr id="2" name="Content Placeholder 1"/>
-          <p:cNvSpPr>
-            <a:spLocks noGrp="1"/>
-          </p:cNvSpPr>
-          <p:nvPr>
-            <p:ph idx="1"/>
-          </p:nvPr>
-        </p:nvSpPr>
-        <p:spPr/>
-        <p:txBody>
-          <a:bodyPr/>
-          <a:lstStyle/>
-          <a:p>
-            <a:r>
-              <a:rPr lang="en-US" dirty="0" smtClean="0"/>
-              <a:t>Detailed flow:</a:t>
-            </a:r>
-            <a:endParaRPr lang="en-US" dirty="0"/>
-          </a:p>
-        </p:txBody>
-      </p:sp>
-      <p:sp>
-        <p:nvSpPr>
-          <p:cNvPr id="3" name="Title 2"/>
-          <p:cNvSpPr>
-            <a:spLocks noGrp="1"/>
-          </p:cNvSpPr>
-          <p:nvPr>
-            <p:ph type="title"/>
-          </p:nvPr>
-        </p:nvSpPr>
-        <p:spPr/>
-        <p:txBody>
-          <a:bodyPr/>
-          <a:lstStyle/>
-          <a:p>
-            <a:r>
-              <a:rPr lang="en-US" dirty="0" smtClean="0"/>
-              <a:t>Spring MVC</a:t>
-            </a:r>
-            <a:endParaRPr lang="en-US" dirty="0"/>
-          </a:p>
-        </p:txBody>
-      </p:sp>
       <p:pic>
         <p:nvPicPr>
           <p:cNvPr id="2053" name="Picture 5" descr="C:\Users\HuanPM\Desktop\spring-mvc-concepts-2.jpg"/>
@@ -4780,8 +4735,8 @@
         </p:blipFill>
         <p:spPr bwMode="auto">
           <a:xfrm>
-            <a:off x="1676400" y="1942648"/>
-            <a:ext cx="5486400" cy="4186760"/>
+            <a:off x="2971800" y="1905000"/>
+            <a:ext cx="5899311" cy="4501858"/>
           </a:xfrm>
           <a:prstGeom prst="rect">
             <a:avLst/>
@@ -4798,6 +4753,87 @@
           </a:extLst>
         </p:spPr>
       </p:pic>
+      <p:sp>
+        <p:nvSpPr>
+          <p:cNvPr id="2" name="Content Placeholder 1"/>
+          <p:cNvSpPr>
+            <a:spLocks noGrp="1"/>
+          </p:cNvSpPr>
+          <p:nvPr>
+            <p:ph idx="1"/>
+          </p:nvPr>
+        </p:nvSpPr>
+        <p:spPr>
+          <a:xfrm>
+            <a:off x="472952" y="1458349"/>
+            <a:ext cx="4632448" cy="5100907"/>
+          </a:xfrm>
+        </p:spPr>
+        <p:txBody>
+          <a:bodyPr>
+            <a:normAutofit/>
+          </a:bodyPr>
+          <a:lstStyle/>
+          <a:p>
+            <a:r>
+              <a:rPr lang="en-US" dirty="0" smtClean="0"/>
+              <a:t>Handler Mapping: map request to a </a:t>
+            </a:r>
+            <a:r>
+              <a:rPr lang="en-US" b="1" dirty="0" smtClean="0"/>
+              <a:t>Controller</a:t>
+            </a:r>
+          </a:p>
+          <a:p>
+            <a:r>
+              <a:rPr lang="en-US" dirty="0" err="1" smtClean="0"/>
+              <a:t>ModelAndView</a:t>
+            </a:r>
+            <a:r>
+              <a:rPr lang="en-US" dirty="0" smtClean="0"/>
+              <a:t>: holder for both Model and View</a:t>
+            </a:r>
+          </a:p>
+          <a:p>
+            <a:r>
+              <a:rPr lang="en-US" dirty="0" smtClean="0"/>
+              <a:t>View Resolver: map view name to a </a:t>
+            </a:r>
+            <a:r>
+              <a:rPr lang="en-US" b="1" dirty="0" smtClean="0"/>
+              <a:t>View</a:t>
+            </a:r>
+            <a:endParaRPr lang="en-US" dirty="0"/>
+          </a:p>
+        </p:txBody>
+      </p:sp>
+      <p:sp>
+        <p:nvSpPr>
+          <p:cNvPr id="3" name="Title 2"/>
+          <p:cNvSpPr>
+            <a:spLocks noGrp="1"/>
+          </p:cNvSpPr>
+          <p:nvPr>
+            <p:ph type="title"/>
+          </p:nvPr>
+        </p:nvSpPr>
+        <p:spPr/>
+        <p:txBody>
+          <a:bodyPr/>
+          <a:lstStyle/>
+          <a:p>
+            <a:r>
+              <a:rPr lang="en-US" dirty="0" smtClean="0"/>
+              <a:t>Spring </a:t>
+            </a:r>
+            <a:r>
+              <a:rPr lang="en-US" dirty="0" smtClean="0"/>
+              <a:t>MVC</a:t>
+            </a:r>
+            <a:endParaRPr lang="en-US" dirty="0"/>
+          </a:p>
+        </p:txBody>
+      </p:sp>
     </p:spTree>
     <p:extLst>
       <p:ext uri="{BB962C8B-B14F-4D97-AF65-F5344CB8AC3E}">
@@ -4914,9 +4950,78 @@
           <a:chExt cx="0" cy="0"/>
         </a:xfrm>
       </p:grpSpPr>
+      <p:sp>
+        <p:nvSpPr>
+          <p:cNvPr id="2" name="Content Placeholder 1"/>
+          <p:cNvSpPr>
+            <a:spLocks noGrp="1"/>
+          </p:cNvSpPr>
+          <p:nvPr>
+            <p:ph idx="1"/>
+          </p:nvPr>
+        </p:nvSpPr>
+        <p:spPr/>
+        <p:txBody>
+          <a:bodyPr/>
+          <a:lstStyle/>
+          <a:p>
+            <a:r>
+              <a:rPr lang="en-US" b="1" dirty="0" smtClean="0"/>
+              <a:t>Hibernate ORM</a:t>
+            </a:r>
+            <a:r>
+              <a:rPr lang="en-US" dirty="0" smtClean="0"/>
+              <a:t> (</a:t>
+            </a:r>
+            <a:r>
+              <a:rPr lang="en-US" b="1" dirty="0" smtClean="0"/>
+              <a:t>Hibernate</a:t>
+            </a:r>
+            <a:r>
+              <a:rPr lang="en-US" dirty="0" smtClean="0"/>
+              <a:t>) is an </a:t>
+            </a:r>
+            <a:r>
+              <a:rPr lang="en-US" b="1" dirty="0" smtClean="0"/>
+              <a:t>ORM</a:t>
+            </a:r>
+            <a:r>
+              <a:rPr lang="en-US" dirty="0"/>
+              <a:t> and persistence framework </a:t>
+            </a:r>
+            <a:r>
+              <a:rPr lang="en-US" dirty="0" smtClean="0"/>
+              <a:t>that allows mapping between objects (even POJOs) and database.</a:t>
+            </a:r>
+          </a:p>
+        </p:txBody>
+      </p:sp>
+      <p:sp>
+        <p:nvSpPr>
+          <p:cNvPr id="3" name="Title 2"/>
+          <p:cNvSpPr>
+            <a:spLocks noGrp="1"/>
+          </p:cNvSpPr>
+          <p:nvPr>
+            <p:ph type="title"/>
+          </p:nvPr>
+        </p:nvSpPr>
+        <p:spPr/>
+        <p:txBody>
+          <a:bodyPr/>
+          <a:lstStyle/>
+          <a:p>
+            <a:r>
+              <a:rPr lang="en-US" dirty="0" smtClean="0"/>
+              <a:t>Hibernate</a:t>
+            </a:r>
+            <a:endParaRPr lang="en-US" dirty="0"/>
+          </a:p>
+        </p:txBody>
+      </p:sp>
       <p:pic>
         <p:nvPicPr>
-          <p:cNvPr id="6146" name="Picture 2" descr="C:\Users\HuanPM\Desktop\hibernate.jpg"/>
+          <p:cNvPr id="2050" name="Picture 2" descr="C:\Users\HuanPM\Desktop\hibernate_position.jpg"/>
           <p:cNvPicPr>
             <a:picLocks noChangeAspect="1" noChangeArrowheads="1"/>
           </p:cNvPicPr>
@@ -4937,8 +5042,8 @@
         </p:blipFill>
         <p:spPr bwMode="auto">
           <a:xfrm>
-            <a:off x="23446" y="3048000"/>
-            <a:ext cx="8382000" cy="2663439"/>
+            <a:off x="762000" y="3200400"/>
+            <a:ext cx="7478091" cy="2209800"/>
           </a:xfrm>
           <a:prstGeom prst="rect">
             <a:avLst/>
@@ -4955,79 +5060,6 @@
           </a:extLst>
         </p:spPr>
       </p:pic>
-      <p:sp>
-        <p:nvSpPr>
-          <p:cNvPr id="2" name="Content Placeholder 1"/>
-          <p:cNvSpPr>
-            <a:spLocks noGrp="1"/>
-          </p:cNvSpPr>
-          <p:nvPr>
-            <p:ph idx="1"/>
-          </p:nvPr>
-        </p:nvSpPr>
-        <p:spPr/>
-        <p:txBody>
-          <a:bodyPr/>
-          <a:lstStyle/>
-          <a:p>
-            <a:r>
-              <a:rPr lang="en-US" b="1" dirty="0" smtClean="0"/>
-              <a:t>Hibernate ORM</a:t>
-            </a:r>
-            <a:r>
-              <a:rPr lang="en-US" dirty="0" smtClean="0"/>
-              <a:t> (</a:t>
-            </a:r>
-            <a:r>
-              <a:rPr lang="en-US" b="1" dirty="0" smtClean="0"/>
-              <a:t>Hibernate</a:t>
-            </a:r>
-            <a:r>
-              <a:rPr lang="en-US" dirty="0" smtClean="0"/>
-              <a:t>) is an </a:t>
-            </a:r>
-            <a:r>
-              <a:rPr lang="en-US" b="1" dirty="0" smtClean="0"/>
-              <a:t>ORM</a:t>
-            </a:r>
-            <a:r>
-              <a:rPr lang="en-US" dirty="0"/>
-              <a:t> and persistence framework </a:t>
-            </a:r>
-            <a:r>
-              <a:rPr lang="en-US" dirty="0" smtClean="0"/>
-              <a:t>that allows mapping between objects (even POJOs) and database</a:t>
-            </a:r>
-            <a:r>
-              <a:rPr lang="en-US" dirty="0" smtClean="0"/>
-              <a:t>.</a:t>
-            </a:r>
-          </a:p>
-        </p:txBody>
-      </p:sp>
-      <p:sp>
-        <p:nvSpPr>
-          <p:cNvPr id="3" name="Title 2"/>
-          <p:cNvSpPr>
-            <a:spLocks noGrp="1"/>
-          </p:cNvSpPr>
-          <p:nvPr>
-            <p:ph type="title"/>
-          </p:nvPr>
-        </p:nvSpPr>
-        <p:spPr/>
-        <p:txBody>
-          <a:bodyPr/>
-          <a:lstStyle/>
-          <a:p>
-            <a:r>
-              <a:rPr lang="en-US" dirty="0" smtClean="0"/>
-              <a:t>Hibernate</a:t>
-            </a:r>
-            <a:endParaRPr lang="en-US" dirty="0"/>
-          </a:p>
-        </p:txBody>
-      </p:sp>
     </p:spTree>
     <p:extLst>
       <p:ext uri="{BB962C8B-B14F-4D97-AF65-F5344CB8AC3E}">
@@ -5088,7 +5120,23 @@
           <a:p>
             <a:r>
               <a:rPr lang="en-US" dirty="0" smtClean="0"/>
-              <a:t>Hibernate generates specific SQL queries based on dialect configuration.</a:t>
+              <a:t>Hibernate </a:t>
+            </a:r>
+            <a:r>
+              <a:rPr lang="en-US" dirty="0" smtClean="0"/>
+              <a:t>generates </a:t>
+            </a:r>
+            <a:r>
+              <a:rPr lang="en-US" dirty="0" smtClean="0"/>
+              <a:t>database-specific </a:t>
+            </a:r>
+            <a:r>
+              <a:rPr lang="en-US" dirty="0" smtClean="0"/>
+              <a:t>SQL </a:t>
+            </a:r>
+            <a:r>
+              <a:rPr lang="en-US" dirty="0" smtClean="0"/>
+              <a:t>queries based on dialect configuration.</a:t>
             </a:r>
             <a:endParaRPr lang="en-US" dirty="0"/>
           </a:p>
@@ -5154,6 +5202,47 @@
           <a:chExt cx="0" cy="0"/>
         </a:xfrm>
       </p:grpSpPr>
+      <p:pic>
+        <p:nvPicPr>
+          <p:cNvPr id="3074" name="Picture 2" descr="C:\Users\HuanPM\Desktop\61dYc.png"/>
+          <p:cNvPicPr>
+            <a:picLocks noChangeAspect="1" noChangeArrowheads="1"/>
+          </p:cNvPicPr>
+          <p:nvPr/>
+        </p:nvPicPr>
+        <p:blipFill>
+          <a:blip r:embed="rId2">
+            <a:extLst>
+              <a:ext uri="{28A0092B-C50C-407E-A947-70E740481C1C}">
+                <a14:useLocalDpi xmlns:a14="http://schemas.microsoft.com/office/drawing/2010/main" val="0"/>
+              </a:ext>
+            </a:extLst>
+          </a:blip>
+          <a:srcRect/>
+          <a:stretch>
+            <a:fillRect/>
+          </a:stretch>
+        </p:blipFill>
+        <p:spPr bwMode="auto">
+          <a:xfrm>
+            <a:off x="5029200" y="914400"/>
+            <a:ext cx="3835685" cy="3200400"/>
+          </a:xfrm>
+          <a:prstGeom prst="rect">
+            <a:avLst/>
+          </a:prstGeom>
+          <a:noFill/>
+          <a:extLst>
+            <a:ext uri="{909E8E84-426E-40DD-AFC4-6F175D3DCCD1}">
+              <a14:hiddenFill xmlns:a14="http://schemas.microsoft.com/office/drawing/2010/main">
+                <a:solidFill>
+                  <a:srgbClr val="FFFFFF"/>
+                </a:solidFill>
+              </a14:hiddenFill>
+            </a:ext>
+          </a:extLst>
+        </p:spPr>
+      </p:pic>
       <p:sp>
         <p:nvSpPr>
           <p:cNvPr id="2" name="Content Placeholder 1"/>
@@ -5164,7 +5253,12 @@
             <p:ph idx="1"/>
           </p:nvPr>
         </p:nvSpPr>
-        <p:spPr/>
+        <p:spPr>
+          <a:xfrm>
+            <a:off x="533400" y="1524000"/>
+            <a:ext cx="5867400" cy="4525963"/>
+          </a:xfrm>
+        </p:spPr>
         <p:txBody>
           <a:bodyPr/>
           <a:lstStyle/>
@@ -5325,6 +5419,14 @@
             <a:pPr lvl="1"/>
             <a:r>
               <a:rPr lang="en-US" dirty="0" smtClean="0"/>
+              <a:t>Work with java objects =&gt; more familiar.</a:t>
+            </a:r>
+            <a:endParaRPr lang="en-US" dirty="0" smtClean="0"/>
+          </a:p>
+          <a:p>
+            <a:pPr lvl="1"/>
+            <a:r>
+              <a:rPr lang="en-US" dirty="0" smtClean="0"/>
               <a:t>Simplify CRUD operation programming.</a:t>
             </a:r>
           </a:p>
@@ -5341,7 +5443,6 @@
               <a:rPr lang="en-US" dirty="0" smtClean="0"/>
               <a:t>Support cache.</a:t>
             </a:r>
-            <a:endParaRPr lang="en-US" dirty="0" smtClean="0"/>
           </a:p>
           <a:p>
             <a:r>
@@ -5413,6 +5514,67 @@
       </p:par>
     </p:tnLst>
   </p:timing>
+</p:sld>
+</file>
+
+<file path=ppt/slides/slide16.xml><?xml version="1.0" encoding="utf-8"?>
+<p:sld xmlns:a="http://schemas.openxmlformats.org/drawingml/2006/main" xmlns:r="http://schemas.openxmlformats.org/officeDocument/2006/relationships" xmlns:p="http://schemas.openxmlformats.org/presentationml/2006/main">
+  <p:cSld>
+    <p:spTree>
+      <p:nvGrpSpPr>
+        <p:cNvPr id="1" name=""/>
+        <p:cNvGrpSpPr/>
+        <p:nvPr/>
+      </p:nvGrpSpPr>
+      <p:grpSpPr>
+        <a:xfrm>
+          <a:off x="0" y="0"/>
+          <a:ext cx="0" cy="0"/>
+          <a:chOff x="0" y="0"/>
+          <a:chExt cx="0" cy="0"/>
+        </a:xfrm>
+      </p:grpSpPr>
+      <p:sp>
+        <p:nvSpPr>
+          <p:cNvPr id="10" name="TextBox 9"/>
+          <p:cNvSpPr txBox="1"/>
+          <p:nvPr/>
+        </p:nvSpPr>
+        <p:spPr>
+          <a:xfrm>
+            <a:off x="1752600" y="2209800"/>
+            <a:ext cx="5715000" cy="1754326"/>
+          </a:xfrm>
+          <a:prstGeom prst="rect">
+            <a:avLst/>
+          </a:prstGeom>
+          <a:noFill/>
+        </p:spPr>
+        <p:txBody>
+          <a:bodyPr wrap="square" rtlCol="0">
+            <a:spAutoFit/>
+          </a:bodyPr>
+          <a:lstStyle/>
+          <a:p>
+            <a:pPr algn="ctr"/>
+            <a:r>
+              <a:rPr lang="en-US" sz="5400" b="1" dirty="0" smtClean="0"/>
+              <a:t>THANK YOU FOR LISTENING!</a:t>
+            </a:r>
+            <a:endParaRPr lang="en-US" sz="5400" b="1" dirty="0"/>
+          </a:p>
+        </p:txBody>
+      </p:sp>
+    </p:spTree>
+    <p:extLst>
+      <p:ext uri="{BB962C8B-B14F-4D97-AF65-F5344CB8AC3E}">
+        <p14:creationId xmlns:p14="http://schemas.microsoft.com/office/powerpoint/2010/main" val="2360340079"/>
+      </p:ext>
+    </p:extLst>
+  </p:cSld>
+  <p:clrMapOvr>
+    <a:masterClrMapping/>
+  </p:clrMapOvr>
 </p:sld>
 </file>
 
@@ -5695,8 +5857,21 @@
           <a:p>
             <a:r>
               <a:rPr lang="en-US" dirty="0" smtClean="0"/>
-              <a:t>Spring is introduced for handling application’s infrastructure.</a:t>
-            </a:r>
+              <a:t>Spring is </a:t>
+            </a:r>
+            <a:r>
+              <a:rPr lang="en-US" dirty="0" smtClean="0"/>
+              <a:t>used for </a:t>
+            </a:r>
+            <a:r>
+              <a:rPr lang="en-US" dirty="0" smtClean="0"/>
+              <a:t>handling application’s </a:t>
+            </a:r>
+            <a:r>
+              <a:rPr lang="en-US" dirty="0" smtClean="0"/>
+              <a:t>infrastructure.</a:t>
+            </a:r>
+            <a:endParaRPr lang="en-US" dirty="0" smtClean="0"/>
           </a:p>
         </p:txBody>
       </p:sp>
@@ -5902,12 +6077,24 @@
           <a:lstStyle/>
           <a:p>
             <a:r>
-              <a:rPr lang="en-US" dirty="0"/>
-              <a:t>The core of Spring </a:t>
-            </a:r>
-            <a:r>
-              <a:rPr lang="en-US" dirty="0" smtClean="0"/>
-              <a:t>is a container which follows </a:t>
+              <a:rPr lang="en-US" dirty="0" smtClean="0"/>
+              <a:t>Spring Core is </a:t>
+            </a:r>
+            <a:r>
+              <a:rPr lang="en-US" dirty="0" smtClean="0"/>
+              <a:t>a </a:t>
+            </a:r>
+            <a:r>
+              <a:rPr lang="en-US" dirty="0" smtClean="0"/>
+              <a:t>container </a:t>
+            </a:r>
+            <a:r>
+              <a:rPr lang="en-US" dirty="0" smtClean="0"/>
+              <a:t>providing</a:t>
+            </a:r>
+            <a:r>
+              <a:rPr lang="en-US" dirty="0" smtClean="0"/>
+              <a:t> </a:t>
             </a:r>
             <a:r>
               <a:rPr lang="en-US" dirty="0"/>
@@ -5923,8 +6110,17 @@
             </a:r>
             <a:r>
               <a:rPr lang="en-US" dirty="0" smtClean="0"/>
-              <a:t>).</a:t>
-            </a:r>
+              <a:t>) </a:t>
+            </a:r>
+            <a:r>
+              <a:rPr lang="en-US" dirty="0"/>
+              <a:t>and Dependency </a:t>
+            </a:r>
+            <a:r>
+              <a:rPr lang="en-US" dirty="0" smtClean="0"/>
+              <a:t>Injection (DI).</a:t>
+            </a:r>
+            <a:endParaRPr lang="en-US" dirty="0" smtClean="0"/>
           </a:p>
           <a:p>
             <a:r>
@@ -6086,25 +6282,52 @@
           <a:lstStyle/>
           <a:p>
             <a:r>
+              <a:rPr lang="en-US" b="1" dirty="0"/>
+              <a:t>Inversion of Control (</a:t>
+            </a:r>
+            <a:r>
+              <a:rPr lang="en-US" b="1" dirty="0" err="1"/>
+              <a:t>IoC</a:t>
+            </a:r>
+            <a:r>
+              <a:rPr lang="en-US" b="1" dirty="0"/>
+              <a:t>) </a:t>
+            </a:r>
+            <a:r>
               <a:rPr lang="en-US" dirty="0"/>
-              <a:t>Inversion of Control (</a:t>
-            </a:r>
-            <a:r>
-              <a:rPr lang="en-US" dirty="0" err="1"/>
+              <a:t>is a design principle describes designs in which </a:t>
+            </a:r>
+            <a:r>
+              <a:rPr lang="en-US" dirty="0" smtClean="0"/>
+              <a:t>inverts control </a:t>
+            </a:r>
+            <a:r>
+              <a:rPr lang="en-US" dirty="0"/>
+              <a:t>flow as compared to traditional </a:t>
+            </a:r>
+            <a:r>
+              <a:rPr lang="en-US" dirty="0" smtClean="0"/>
+              <a:t>procedural programming.</a:t>
+            </a:r>
+          </a:p>
+          <a:p>
+            <a:pPr lvl="1"/>
+            <a:r>
+              <a:rPr lang="en-US" dirty="0" smtClean="0"/>
+              <a:t>Traditional: application code =&gt; framework code.</a:t>
+            </a:r>
+          </a:p>
+          <a:p>
+            <a:pPr lvl="1"/>
+            <a:r>
+              <a:rPr lang="en-US" dirty="0" err="1" smtClean="0"/>
               <a:t>IoC</a:t>
             </a:r>
             <a:r>
-              <a:rPr lang="en-US" dirty="0"/>
-              <a:t>) is a design principle describes designs in which </a:t>
-            </a:r>
-            <a:r>
-              <a:rPr lang="en-US" dirty="0" smtClean="0"/>
-              <a:t>inverts control </a:t>
-            </a:r>
-            <a:r>
-              <a:rPr lang="en-US" dirty="0"/>
-              <a:t>flow as compared to traditional programming.</a:t>
-            </a:r>
+              <a:rPr lang="en-US" dirty="0" smtClean="0"/>
+              <a:t>: framework code =&gt; application code.</a:t>
+            </a:r>
+            <a:endParaRPr lang="en-US" dirty="0"/>
           </a:p>
           <a:p>
             <a:r>
@@ -6183,47 +6406,6 @@
           <a:chExt cx="0" cy="0"/>
         </a:xfrm>
       </p:grpSpPr>
-      <p:pic>
-        <p:nvPicPr>
-          <p:cNvPr id="4098" name="Picture 2" descr="C:\Users\HuanPM\Desktop\ekYdF.png"/>
-          <p:cNvPicPr>
-            <a:picLocks noChangeAspect="1" noChangeArrowheads="1"/>
-          </p:cNvPicPr>
-          <p:nvPr/>
-        </p:nvPicPr>
-        <p:blipFill>
-          <a:blip r:embed="rId2">
-            <a:extLst>
-              <a:ext uri="{28A0092B-C50C-407E-A947-70E740481C1C}">
-                <a14:useLocalDpi xmlns:a14="http://schemas.microsoft.com/office/drawing/2010/main" val="0"/>
-              </a:ext>
-            </a:extLst>
-          </a:blip>
-          <a:srcRect/>
-          <a:stretch>
-            <a:fillRect/>
-          </a:stretch>
-        </p:blipFill>
-        <p:spPr bwMode="auto">
-          <a:xfrm>
-            <a:off x="1371599" y="3962400"/>
-            <a:ext cx="2743201" cy="2133600"/>
-          </a:xfrm>
-          <a:prstGeom prst="rect">
-            <a:avLst/>
-          </a:prstGeom>
-          <a:noFill/>
-          <a:extLst>
-            <a:ext uri="{909E8E84-426E-40DD-AFC4-6F175D3DCCD1}">
-              <a14:hiddenFill xmlns:a14="http://schemas.microsoft.com/office/drawing/2010/main">
-                <a:solidFill>
-                  <a:srgbClr val="FFFFFF"/>
-                </a:solidFill>
-              </a14:hiddenFill>
-            </a:ext>
-          </a:extLst>
-        </p:spPr>
-      </p:pic>
       <p:sp>
         <p:nvSpPr>
           <p:cNvPr id="2" name="Content Placeholder 1"/>
@@ -6240,8 +6422,12 @@
           <a:lstStyle/>
           <a:p>
             <a:r>
-              <a:rPr lang="en-US" dirty="0" smtClean="0"/>
-              <a:t>Dependency Injection (DI) is a way to implement </a:t>
+              <a:rPr lang="en-US" b="1" dirty="0" smtClean="0"/>
+              <a:t>Dependency Injection (DI) </a:t>
+            </a:r>
+            <a:r>
+              <a:rPr lang="en-US" dirty="0" smtClean="0"/>
+              <a:t>is a way to implement </a:t>
             </a:r>
             <a:r>
               <a:rPr lang="en-US" dirty="0" err="1" smtClean="0"/>
@@ -6255,7 +6441,11 @@
           <a:p>
             <a:r>
               <a:rPr lang="en-US" dirty="0" smtClean="0"/>
-              <a:t>In DI:</a:t>
+              <a:t>In </a:t>
+            </a:r>
+            <a:r>
+              <a:rPr lang="en-US" dirty="0" smtClean="0"/>
+              <a:t>DI:</a:t>
             </a:r>
           </a:p>
           <a:p>
@@ -6277,8 +6467,20 @@
             <a:pPr lvl="1"/>
             <a:r>
               <a:rPr lang="en-US" dirty="0" smtClean="0"/>
-              <a:t>Modules communicate via interfaces.</a:t>
-            </a:r>
+              <a:t>Modules communicate via interfaces</a:t>
+            </a:r>
+            <a:r>
+              <a:rPr lang="en-US" dirty="0" smtClean="0"/>
+              <a:t>.</a:t>
+            </a:r>
+          </a:p>
+          <a:p>
+            <a:pPr lvl="1"/>
+            <a:r>
+              <a:rPr lang="en-US" dirty="0" smtClean="0"/>
+              <a:t>Objects are given their dependencies rather than construct them.</a:t>
+            </a:r>
+            <a:endParaRPr lang="en-US" dirty="0" smtClean="0"/>
           </a:p>
           <a:p>
             <a:endParaRPr lang="en-US" dirty="0"/>
@@ -6361,24 +6563,40 @@
           <a:lstStyle/>
           <a:p>
             <a:r>
-              <a:rPr lang="en-US" dirty="0" smtClean="0"/>
-              <a:t>Spring MVC: a MVC framework designed </a:t>
+              <a:rPr lang="en-US" b="1" dirty="0" smtClean="0"/>
+              <a:t>Spring MVC</a:t>
+            </a:r>
+            <a:r>
+              <a:rPr lang="en-US" dirty="0" smtClean="0"/>
+              <a:t>: a MVC framework designed </a:t>
             </a:r>
             <a:r>
               <a:rPr lang="en-US" dirty="0"/>
               <a:t>around a </a:t>
             </a:r>
             <a:r>
+              <a:rPr lang="en-US" dirty="0" smtClean="0"/>
+              <a:t>front </a:t>
+            </a:r>
+            <a:r>
+              <a:rPr lang="en-US" dirty="0"/>
+              <a:t>controller named </a:t>
+            </a:r>
+            <a:r>
               <a:rPr lang="en-US" dirty="0" err="1" smtClean="0"/>
               <a:t>DispatcherServlet</a:t>
             </a:r>
             <a:r>
               <a:rPr lang="en-US" dirty="0" smtClean="0"/>
-              <a:t> (front controller)</a:t>
+              <a:t> </a:t>
+            </a:r>
+            <a:r>
+              <a:rPr lang="en-US" dirty="0" smtClean="0"/>
+              <a:t>that </a:t>
             </a:r>
             <a:r>
               <a:rPr lang="en-US" dirty="0"/>
-              <a:t> that dispatches requests to </a:t>
+              <a:t>dispatches requests to </a:t>
             </a:r>
             <a:r>
               <a:rPr lang="en-US" dirty="0" smtClean="0"/>

</xml_diff>

<commit_message>
Update ppt to version 0.3
</commit_message>
<xml_diff>
--- a/Spring.pptx
+++ b/Spring.pptx
@@ -7,19 +7,19 @@
   <p:sldIdLst>
     <p:sldId id="256" r:id="rId2"/>
     <p:sldId id="257" r:id="rId3"/>
-    <p:sldId id="261" r:id="rId4"/>
-    <p:sldId id="258" r:id="rId5"/>
-    <p:sldId id="263" r:id="rId6"/>
+    <p:sldId id="258" r:id="rId4"/>
+    <p:sldId id="263" r:id="rId5"/>
+    <p:sldId id="273" r:id="rId6"/>
     <p:sldId id="265" r:id="rId7"/>
-    <p:sldId id="267" r:id="rId8"/>
-    <p:sldId id="266" r:id="rId9"/>
-    <p:sldId id="268" r:id="rId10"/>
-    <p:sldId id="260" r:id="rId11"/>
-    <p:sldId id="262" r:id="rId12"/>
-    <p:sldId id="259" r:id="rId13"/>
-    <p:sldId id="270" r:id="rId14"/>
-    <p:sldId id="269" r:id="rId15"/>
-    <p:sldId id="264" r:id="rId16"/>
+    <p:sldId id="274" r:id="rId8"/>
+    <p:sldId id="267" r:id="rId9"/>
+    <p:sldId id="266" r:id="rId10"/>
+    <p:sldId id="272" r:id="rId11"/>
+    <p:sldId id="276" r:id="rId12"/>
+    <p:sldId id="277" r:id="rId13"/>
+    <p:sldId id="275" r:id="rId14"/>
+    <p:sldId id="268" r:id="rId15"/>
+    <p:sldId id="260" r:id="rId16"/>
     <p:sldId id="271" r:id="rId17"/>
   </p:sldIdLst>
   <p:sldSz cx="9144000" cy="6858000" type="screen4x3"/>
@@ -748,7 +748,7 @@
             <a:fld id="{1D8BD707-D9CF-40AE-B4C6-C98DA3205C09}" type="datetimeFigureOut">
               <a:rPr lang="en-US" smtClean="0"/>
               <a:pPr/>
-              <a:t>10/25/2016</a:t>
+              <a:t>10/28/2016</a:t>
             </a:fld>
             <a:endParaRPr lang="en-US"/>
           </a:p>
@@ -946,7 +946,7 @@
             <a:fld id="{1D8BD707-D9CF-40AE-B4C6-C98DA3205C09}" type="datetimeFigureOut">
               <a:rPr lang="en-US" smtClean="0"/>
               <a:pPr/>
-              <a:t>10/25/2016</a:t>
+              <a:t>10/28/2016</a:t>
             </a:fld>
             <a:endParaRPr lang="en-US"/>
           </a:p>
@@ -1133,7 +1133,7 @@
             <a:fld id="{1D8BD707-D9CF-40AE-B4C6-C98DA3205C09}" type="datetimeFigureOut">
               <a:rPr lang="en-US" smtClean="0"/>
               <a:pPr/>
-              <a:t>10/25/2016</a:t>
+              <a:t>10/28/2016</a:t>
             </a:fld>
             <a:endParaRPr lang="en-US"/>
           </a:p>
@@ -1285,7 +1285,7 @@
             <a:fld id="{1D8BD707-D9CF-40AE-B4C6-C98DA3205C09}" type="datetimeFigureOut">
               <a:rPr lang="en-US" smtClean="0"/>
               <a:pPr/>
-              <a:t>10/25/2016</a:t>
+              <a:t>10/28/2016</a:t>
             </a:fld>
             <a:endParaRPr lang="en-US"/>
           </a:p>
@@ -1542,7 +1542,7 @@
             <a:fld id="{1D8BD707-D9CF-40AE-B4C6-C98DA3205C09}" type="datetimeFigureOut">
               <a:rPr lang="en-US" smtClean="0"/>
               <a:pPr/>
-              <a:t>10/25/2016</a:t>
+              <a:t>10/28/2016</a:t>
             </a:fld>
             <a:endParaRPr lang="en-US"/>
           </a:p>
@@ -1953,7 +1953,7 @@
             <a:fld id="{1D8BD707-D9CF-40AE-B4C6-C98DA3205C09}" type="datetimeFigureOut">
               <a:rPr lang="en-US" smtClean="0"/>
               <a:pPr/>
-              <a:t>10/25/2016</a:t>
+              <a:t>10/28/2016</a:t>
             </a:fld>
             <a:endParaRPr lang="en-US"/>
           </a:p>
@@ -2401,7 +2401,7 @@
             <a:fld id="{1D8BD707-D9CF-40AE-B4C6-C98DA3205C09}" type="datetimeFigureOut">
               <a:rPr lang="en-US" smtClean="0"/>
               <a:pPr/>
-              <a:t>10/25/2016</a:t>
+              <a:t>10/28/2016</a:t>
             </a:fld>
             <a:endParaRPr lang="en-US"/>
           </a:p>
@@ -2504,7 +2504,7 @@
             <a:fld id="{1D8BD707-D9CF-40AE-B4C6-C98DA3205C09}" type="datetimeFigureOut">
               <a:rPr lang="en-US" smtClean="0"/>
               <a:pPr/>
-              <a:t>10/25/2016</a:t>
+              <a:t>10/28/2016</a:t>
             </a:fld>
             <a:endParaRPr lang="en-US"/>
           </a:p>
@@ -2627,7 +2627,7 @@
             <a:fld id="{1D8BD707-D9CF-40AE-B4C6-C98DA3205C09}" type="datetimeFigureOut">
               <a:rPr lang="en-US" smtClean="0"/>
               <a:pPr/>
-              <a:t>10/25/2016</a:t>
+              <a:t>10/28/2016</a:t>
             </a:fld>
             <a:endParaRPr lang="en-US"/>
           </a:p>
@@ -2903,7 +2903,7 @@
             <a:fld id="{1D8BD707-D9CF-40AE-B4C6-C98DA3205C09}" type="datetimeFigureOut">
               <a:rPr lang="en-US" smtClean="0"/>
               <a:pPr/>
-              <a:t>10/25/2016</a:t>
+              <a:t>10/28/2016</a:t>
             </a:fld>
             <a:endParaRPr lang="en-US"/>
           </a:p>
@@ -3110,7 +3110,7 @@
             <a:fld id="{1D8BD707-D9CF-40AE-B4C6-C98DA3205C09}" type="datetimeFigureOut">
               <a:rPr lang="en-US" smtClean="0"/>
               <a:pPr/>
-              <a:t>10/25/2016</a:t>
+              <a:t>10/28/2016</a:t>
             </a:fld>
             <a:endParaRPr lang="en-US"/>
           </a:p>
@@ -4221,7 +4221,7 @@
             <a:fld id="{1D8BD707-D9CF-40AE-B4C6-C98DA3205C09}" type="datetimeFigureOut">
               <a:rPr lang="en-US" smtClean="0"/>
               <a:pPr/>
-              <a:t>10/25/2016</a:t>
+              <a:t>10/28/2016</a:t>
             </a:fld>
             <a:endParaRPr lang="en-US"/>
           </a:p>
@@ -4646,7 +4646,7 @@
           <a:p>
             <a:r>
               <a:rPr lang="en-US" dirty="0" smtClean="0"/>
-              <a:t>Spring &amp; Hibernate</a:t>
+              <a:t>Spring</a:t>
             </a:r>
             <a:endParaRPr lang="en-US" dirty="0"/>
           </a:p>
@@ -4696,6 +4696,811 @@
 </file>
 
 <file path=ppt/slides/slide10.xml><?xml version="1.0" encoding="utf-8"?>
+<p:sld xmlns:a="http://schemas.openxmlformats.org/drawingml/2006/main" xmlns:r="http://schemas.openxmlformats.org/officeDocument/2006/relationships" xmlns:p="http://schemas.openxmlformats.org/presentationml/2006/main">
+  <p:cSld>
+    <p:spTree>
+      <p:nvGrpSpPr>
+        <p:cNvPr id="1" name=""/>
+        <p:cNvGrpSpPr/>
+        <p:nvPr/>
+      </p:nvGrpSpPr>
+      <p:grpSpPr>
+        <a:xfrm>
+          <a:off x="0" y="0"/>
+          <a:ext cx="0" cy="0"/>
+          <a:chOff x="0" y="0"/>
+          <a:chExt cx="0" cy="0"/>
+        </a:xfrm>
+      </p:grpSpPr>
+      <p:sp>
+        <p:nvSpPr>
+          <p:cNvPr id="2" name="Content Placeholder 1"/>
+          <p:cNvSpPr>
+            <a:spLocks noGrp="1"/>
+          </p:cNvSpPr>
+          <p:nvPr>
+            <p:ph idx="1"/>
+          </p:nvPr>
+        </p:nvSpPr>
+        <p:spPr/>
+        <p:txBody>
+          <a:bodyPr/>
+          <a:lstStyle/>
+          <a:p>
+            <a:r>
+              <a:rPr lang="en-US" dirty="0" smtClean="0"/>
+              <a:t>There are 2 methods to do a DI in Spring framework:</a:t>
+            </a:r>
+          </a:p>
+          <a:p>
+            <a:pPr lvl="1"/>
+            <a:r>
+              <a:rPr lang="en-US" dirty="0" smtClean="0"/>
+              <a:t>Setter injection</a:t>
+            </a:r>
+          </a:p>
+          <a:p>
+            <a:pPr lvl="1"/>
+            <a:r>
+              <a:rPr lang="en-US" dirty="0" smtClean="0"/>
+              <a:t>Constructor injection</a:t>
+            </a:r>
+          </a:p>
+        </p:txBody>
+      </p:sp>
+      <p:sp>
+        <p:nvSpPr>
+          <p:cNvPr id="3" name="Title 2"/>
+          <p:cNvSpPr>
+            <a:spLocks noGrp="1"/>
+          </p:cNvSpPr>
+          <p:nvPr>
+            <p:ph type="title"/>
+          </p:nvPr>
+        </p:nvSpPr>
+        <p:spPr/>
+        <p:txBody>
+          <a:bodyPr/>
+          <a:lstStyle/>
+          <a:p>
+            <a:r>
+              <a:rPr lang="en-US" dirty="0"/>
+              <a:t>Dependency Injection</a:t>
+            </a:r>
+          </a:p>
+        </p:txBody>
+      </p:sp>
+    </p:spTree>
+    <p:extLst>
+      <p:ext uri="{BB962C8B-B14F-4D97-AF65-F5344CB8AC3E}">
+        <p14:creationId xmlns:p14="http://schemas.microsoft.com/office/powerpoint/2010/main" val="3091580530"/>
+      </p:ext>
+    </p:extLst>
+  </p:cSld>
+  <p:clrMapOvr>
+    <a:masterClrMapping/>
+  </p:clrMapOvr>
+</p:sld>
+</file>
+
+<file path=ppt/slides/slide11.xml><?xml version="1.0" encoding="utf-8"?>
+<p:sld xmlns:a="http://schemas.openxmlformats.org/drawingml/2006/main" xmlns:r="http://schemas.openxmlformats.org/officeDocument/2006/relationships" xmlns:p="http://schemas.openxmlformats.org/presentationml/2006/main">
+  <p:cSld>
+    <p:spTree>
+      <p:nvGrpSpPr>
+        <p:cNvPr id="1" name=""/>
+        <p:cNvGrpSpPr/>
+        <p:nvPr/>
+      </p:nvGrpSpPr>
+      <p:grpSpPr>
+        <a:xfrm>
+          <a:off x="0" y="0"/>
+          <a:ext cx="0" cy="0"/>
+          <a:chOff x="0" y="0"/>
+          <a:chExt cx="0" cy="0"/>
+        </a:xfrm>
+      </p:grpSpPr>
+      <p:sp>
+        <p:nvSpPr>
+          <p:cNvPr id="2" name="Content Placeholder 1"/>
+          <p:cNvSpPr>
+            <a:spLocks noGrp="1"/>
+          </p:cNvSpPr>
+          <p:nvPr>
+            <p:ph idx="1"/>
+          </p:nvPr>
+        </p:nvSpPr>
+        <p:spPr/>
+        <p:txBody>
+          <a:bodyPr/>
+          <a:lstStyle/>
+          <a:p>
+            <a:r>
+              <a:rPr lang="en-US" dirty="0" smtClean="0"/>
+              <a:t>Setter injection</a:t>
+            </a:r>
+            <a:endParaRPr lang="en-US" dirty="0"/>
+          </a:p>
+        </p:txBody>
+      </p:sp>
+      <p:sp>
+        <p:nvSpPr>
+          <p:cNvPr id="3" name="Title 2"/>
+          <p:cNvSpPr>
+            <a:spLocks noGrp="1"/>
+          </p:cNvSpPr>
+          <p:nvPr>
+            <p:ph type="title"/>
+          </p:nvPr>
+        </p:nvSpPr>
+        <p:spPr/>
+        <p:txBody>
+          <a:bodyPr/>
+          <a:lstStyle/>
+          <a:p>
+            <a:r>
+              <a:rPr lang="en-US" dirty="0"/>
+              <a:t>Dependency Injection</a:t>
+            </a:r>
+          </a:p>
+        </p:txBody>
+      </p:sp>
+      <p:pic>
+        <p:nvPicPr>
+          <p:cNvPr id="2052" name="Picture 4" descr="C:\Users\HuanPM\Desktop\Untitled2.jpg"/>
+          <p:cNvPicPr>
+            <a:picLocks noChangeAspect="1" noChangeArrowheads="1"/>
+          </p:cNvPicPr>
+          <p:nvPr/>
+        </p:nvPicPr>
+        <p:blipFill>
+          <a:blip r:embed="rId2">
+            <a:extLst>
+              <a:ext uri="{28A0092B-C50C-407E-A947-70E740481C1C}">
+                <a14:useLocalDpi xmlns:a14="http://schemas.microsoft.com/office/drawing/2010/main" val="0"/>
+              </a:ext>
+            </a:extLst>
+          </a:blip>
+          <a:srcRect/>
+          <a:stretch>
+            <a:fillRect/>
+          </a:stretch>
+        </p:blipFill>
+        <p:spPr bwMode="auto">
+          <a:xfrm>
+            <a:off x="457200" y="1905000"/>
+            <a:ext cx="5743575" cy="2981325"/>
+          </a:xfrm>
+          <a:prstGeom prst="rect">
+            <a:avLst/>
+          </a:prstGeom>
+          <a:noFill/>
+          <a:extLst>
+            <a:ext uri="{909E8E84-426E-40DD-AFC4-6F175D3DCCD1}">
+              <a14:hiddenFill xmlns:a14="http://schemas.microsoft.com/office/drawing/2010/main">
+                <a:solidFill>
+                  <a:srgbClr val="FFFFFF"/>
+                </a:solidFill>
+              </a14:hiddenFill>
+            </a:ext>
+          </a:extLst>
+        </p:spPr>
+      </p:pic>
+      <p:pic>
+        <p:nvPicPr>
+          <p:cNvPr id="2053" name="Picture 5" descr="C:\Users\HuanPM\Desktop\Untitled.jpg"/>
+          <p:cNvPicPr>
+            <a:picLocks noChangeAspect="1" noChangeArrowheads="1"/>
+          </p:cNvPicPr>
+          <p:nvPr/>
+        </p:nvPicPr>
+        <p:blipFill>
+          <a:blip r:embed="rId3">
+            <a:extLst>
+              <a:ext uri="{28A0092B-C50C-407E-A947-70E740481C1C}">
+                <a14:useLocalDpi xmlns:a14="http://schemas.microsoft.com/office/drawing/2010/main" val="0"/>
+              </a:ext>
+            </a:extLst>
+          </a:blip>
+          <a:srcRect/>
+          <a:stretch>
+            <a:fillRect/>
+          </a:stretch>
+        </p:blipFill>
+        <p:spPr bwMode="auto">
+          <a:xfrm>
+            <a:off x="2971800" y="3876368"/>
+            <a:ext cx="5762625" cy="2705100"/>
+          </a:xfrm>
+          <a:prstGeom prst="rect">
+            <a:avLst/>
+          </a:prstGeom>
+          <a:noFill/>
+          <a:extLst>
+            <a:ext uri="{909E8E84-426E-40DD-AFC4-6F175D3DCCD1}">
+              <a14:hiddenFill xmlns:a14="http://schemas.microsoft.com/office/drawing/2010/main">
+                <a:solidFill>
+                  <a:srgbClr val="FFFFFF"/>
+                </a:solidFill>
+              </a14:hiddenFill>
+            </a:ext>
+          </a:extLst>
+        </p:spPr>
+      </p:pic>
+      <p:cxnSp>
+        <p:nvCxnSpPr>
+          <p:cNvPr id="17" name="Curved Connector 16"/>
+          <p:cNvCxnSpPr/>
+          <p:nvPr/>
+        </p:nvCxnSpPr>
+        <p:spPr>
+          <a:xfrm rot="10800000">
+            <a:off x="4419600" y="2971800"/>
+            <a:ext cx="2209800" cy="2133600"/>
+          </a:xfrm>
+          <a:prstGeom prst="curvedConnector3">
+            <a:avLst/>
+          </a:prstGeom>
+          <a:ln>
+            <a:solidFill>
+              <a:schemeClr val="accent2"/>
+            </a:solidFill>
+            <a:tailEnd type="arrow"/>
+          </a:ln>
+        </p:spPr>
+        <p:style>
+          <a:lnRef idx="1">
+            <a:schemeClr val="accent1"/>
+          </a:lnRef>
+          <a:fillRef idx="0">
+            <a:schemeClr val="accent1"/>
+          </a:fillRef>
+          <a:effectRef idx="0">
+            <a:schemeClr val="accent1"/>
+          </a:effectRef>
+          <a:fontRef idx="minor">
+            <a:schemeClr val="tx1"/>
+          </a:fontRef>
+        </p:style>
+      </p:cxnSp>
+      <p:sp>
+        <p:nvSpPr>
+          <p:cNvPr id="18" name="TextBox 17"/>
+          <p:cNvSpPr txBox="1"/>
+          <p:nvPr/>
+        </p:nvSpPr>
+        <p:spPr>
+          <a:xfrm>
+            <a:off x="4838700" y="2295757"/>
+            <a:ext cx="3581400" cy="646331"/>
+          </a:xfrm>
+          <a:prstGeom prst="rect">
+            <a:avLst/>
+          </a:prstGeom>
+          <a:noFill/>
+        </p:spPr>
+        <p:txBody>
+          <a:bodyPr wrap="square" rtlCol="0">
+            <a:spAutoFit/>
+          </a:bodyPr>
+          <a:lstStyle/>
+          <a:p>
+            <a:r>
+              <a:rPr lang="en-US" dirty="0" smtClean="0"/>
+              <a:t>Container injects dependency to parameter of setter method</a:t>
+            </a:r>
+            <a:endParaRPr lang="en-US" dirty="0"/>
+          </a:p>
+        </p:txBody>
+      </p:sp>
+    </p:spTree>
+    <p:extLst>
+      <p:ext uri="{BB962C8B-B14F-4D97-AF65-F5344CB8AC3E}">
+        <p14:creationId xmlns:p14="http://schemas.microsoft.com/office/powerpoint/2010/main" val="1648647525"/>
+      </p:ext>
+    </p:extLst>
+  </p:cSld>
+  <p:clrMapOvr>
+    <a:masterClrMapping/>
+  </p:clrMapOvr>
+</p:sld>
+</file>
+
+<file path=ppt/slides/slide12.xml><?xml version="1.0" encoding="utf-8"?>
+<p:sld xmlns:a="http://schemas.openxmlformats.org/drawingml/2006/main" xmlns:r="http://schemas.openxmlformats.org/officeDocument/2006/relationships" xmlns:p="http://schemas.openxmlformats.org/presentationml/2006/main">
+  <p:cSld>
+    <p:spTree>
+      <p:nvGrpSpPr>
+        <p:cNvPr id="1" name=""/>
+        <p:cNvGrpSpPr/>
+        <p:nvPr/>
+      </p:nvGrpSpPr>
+      <p:grpSpPr>
+        <a:xfrm>
+          <a:off x="0" y="0"/>
+          <a:ext cx="0" cy="0"/>
+          <a:chOff x="0" y="0"/>
+          <a:chExt cx="0" cy="0"/>
+        </a:xfrm>
+      </p:grpSpPr>
+      <p:sp>
+        <p:nvSpPr>
+          <p:cNvPr id="2" name="Content Placeholder 1"/>
+          <p:cNvSpPr>
+            <a:spLocks noGrp="1"/>
+          </p:cNvSpPr>
+          <p:nvPr>
+            <p:ph idx="1"/>
+          </p:nvPr>
+        </p:nvSpPr>
+        <p:spPr/>
+        <p:txBody>
+          <a:bodyPr/>
+          <a:lstStyle/>
+          <a:p>
+            <a:r>
+              <a:rPr lang="en-US" dirty="0" smtClean="0"/>
+              <a:t>Constructor injection</a:t>
+            </a:r>
+            <a:endParaRPr lang="en-US" dirty="0"/>
+          </a:p>
+        </p:txBody>
+      </p:sp>
+      <p:sp>
+        <p:nvSpPr>
+          <p:cNvPr id="3" name="Title 2"/>
+          <p:cNvSpPr>
+            <a:spLocks noGrp="1"/>
+          </p:cNvSpPr>
+          <p:nvPr>
+            <p:ph type="title"/>
+          </p:nvPr>
+        </p:nvSpPr>
+        <p:spPr/>
+        <p:txBody>
+          <a:bodyPr/>
+          <a:lstStyle/>
+          <a:p>
+            <a:r>
+              <a:rPr lang="en-US" dirty="0"/>
+              <a:t>Dependency Injection</a:t>
+            </a:r>
+          </a:p>
+        </p:txBody>
+      </p:sp>
+      <p:pic>
+        <p:nvPicPr>
+          <p:cNvPr id="3075" name="Picture 3" descr="C:\Users\HuanPM\Desktop\Untitled3.png"/>
+          <p:cNvPicPr>
+            <a:picLocks noChangeAspect="1" noChangeArrowheads="1"/>
+          </p:cNvPicPr>
+          <p:nvPr/>
+        </p:nvPicPr>
+        <p:blipFill>
+          <a:blip r:embed="rId2">
+            <a:extLst>
+              <a:ext uri="{28A0092B-C50C-407E-A947-70E740481C1C}">
+                <a14:useLocalDpi xmlns:a14="http://schemas.microsoft.com/office/drawing/2010/main" val="0"/>
+              </a:ext>
+            </a:extLst>
+          </a:blip>
+          <a:srcRect/>
+          <a:stretch>
+            <a:fillRect/>
+          </a:stretch>
+        </p:blipFill>
+        <p:spPr bwMode="auto">
+          <a:xfrm>
+            <a:off x="457200" y="2032710"/>
+            <a:ext cx="5754688" cy="2114550"/>
+          </a:xfrm>
+          <a:prstGeom prst="rect">
+            <a:avLst/>
+          </a:prstGeom>
+          <a:noFill/>
+          <a:extLst>
+            <a:ext uri="{909E8E84-426E-40DD-AFC4-6F175D3DCCD1}">
+              <a14:hiddenFill xmlns:a14="http://schemas.microsoft.com/office/drawing/2010/main">
+                <a:solidFill>
+                  <a:srgbClr val="FFFFFF"/>
+                </a:solidFill>
+              </a14:hiddenFill>
+            </a:ext>
+          </a:extLst>
+        </p:spPr>
+      </p:pic>
+      <p:pic>
+        <p:nvPicPr>
+          <p:cNvPr id="3074" name="Picture 2" descr="C:\Users\HuanPM\Desktop\Untitled4.png"/>
+          <p:cNvPicPr>
+            <a:picLocks noChangeAspect="1" noChangeArrowheads="1"/>
+          </p:cNvPicPr>
+          <p:nvPr/>
+        </p:nvPicPr>
+        <p:blipFill>
+          <a:blip r:embed="rId3">
+            <a:extLst>
+              <a:ext uri="{28A0092B-C50C-407E-A947-70E740481C1C}">
+                <a14:useLocalDpi xmlns:a14="http://schemas.microsoft.com/office/drawing/2010/main" val="0"/>
+              </a:ext>
+            </a:extLst>
+          </a:blip>
+          <a:srcRect/>
+          <a:stretch>
+            <a:fillRect/>
+          </a:stretch>
+        </p:blipFill>
+        <p:spPr bwMode="auto">
+          <a:xfrm>
+            <a:off x="2971800" y="3733800"/>
+            <a:ext cx="5735637" cy="2676525"/>
+          </a:xfrm>
+          <a:prstGeom prst="rect">
+            <a:avLst/>
+          </a:prstGeom>
+          <a:noFill/>
+          <a:extLst>
+            <a:ext uri="{909E8E84-426E-40DD-AFC4-6F175D3DCCD1}">
+              <a14:hiddenFill xmlns:a14="http://schemas.microsoft.com/office/drawing/2010/main">
+                <a:solidFill>
+                  <a:srgbClr val="FFFFFF"/>
+                </a:solidFill>
+              </a14:hiddenFill>
+            </a:ext>
+          </a:extLst>
+        </p:spPr>
+      </p:pic>
+      <p:sp>
+        <p:nvSpPr>
+          <p:cNvPr id="6" name="TextBox 5"/>
+          <p:cNvSpPr txBox="1"/>
+          <p:nvPr/>
+        </p:nvSpPr>
+        <p:spPr>
+          <a:xfrm>
+            <a:off x="4911399" y="2762201"/>
+            <a:ext cx="3581400" cy="646331"/>
+          </a:xfrm>
+          <a:prstGeom prst="rect">
+            <a:avLst/>
+          </a:prstGeom>
+          <a:noFill/>
+        </p:spPr>
+        <p:txBody>
+          <a:bodyPr wrap="square" rtlCol="0">
+            <a:spAutoFit/>
+          </a:bodyPr>
+          <a:lstStyle/>
+          <a:p>
+            <a:r>
+              <a:rPr lang="en-US" dirty="0" smtClean="0"/>
+              <a:t>Container injects dependency to argument of constructor</a:t>
+            </a:r>
+            <a:endParaRPr lang="en-US" dirty="0"/>
+          </a:p>
+        </p:txBody>
+      </p:sp>
+      <p:cxnSp>
+        <p:nvCxnSpPr>
+          <p:cNvPr id="5" name="Curved Connector 4"/>
+          <p:cNvCxnSpPr/>
+          <p:nvPr/>
+        </p:nvCxnSpPr>
+        <p:spPr>
+          <a:xfrm rot="10800000">
+            <a:off x="4038600" y="3505200"/>
+            <a:ext cx="1801018" cy="1676400"/>
+          </a:xfrm>
+          <a:prstGeom prst="curvedConnector3">
+            <a:avLst/>
+          </a:prstGeom>
+          <a:ln>
+            <a:solidFill>
+              <a:schemeClr val="accent2"/>
+            </a:solidFill>
+            <a:tailEnd type="arrow"/>
+          </a:ln>
+        </p:spPr>
+        <p:style>
+          <a:lnRef idx="1">
+            <a:schemeClr val="accent1"/>
+          </a:lnRef>
+          <a:fillRef idx="0">
+            <a:schemeClr val="accent1"/>
+          </a:fillRef>
+          <a:effectRef idx="0">
+            <a:schemeClr val="accent1"/>
+          </a:effectRef>
+          <a:fontRef idx="minor">
+            <a:schemeClr val="tx1"/>
+          </a:fontRef>
+        </p:style>
+      </p:cxnSp>
+    </p:spTree>
+    <p:extLst>
+      <p:ext uri="{BB962C8B-B14F-4D97-AF65-F5344CB8AC3E}">
+        <p14:creationId xmlns:p14="http://schemas.microsoft.com/office/powerpoint/2010/main" val="3597726148"/>
+      </p:ext>
+    </p:extLst>
+  </p:cSld>
+  <p:clrMapOvr>
+    <a:masterClrMapping/>
+  </p:clrMapOvr>
+</p:sld>
+</file>
+
+<file path=ppt/slides/slide13.xml><?xml version="1.0" encoding="utf-8"?>
+<p:sld xmlns:a="http://schemas.openxmlformats.org/drawingml/2006/main" xmlns:r="http://schemas.openxmlformats.org/officeDocument/2006/relationships" xmlns:p="http://schemas.openxmlformats.org/presentationml/2006/main">
+  <p:cSld>
+    <p:spTree>
+      <p:nvGrpSpPr>
+        <p:cNvPr id="1" name=""/>
+        <p:cNvGrpSpPr/>
+        <p:nvPr/>
+      </p:nvGrpSpPr>
+      <p:grpSpPr>
+        <a:xfrm>
+          <a:off x="0" y="0"/>
+          <a:ext cx="0" cy="0"/>
+          <a:chOff x="0" y="0"/>
+          <a:chExt cx="0" cy="0"/>
+        </a:xfrm>
+      </p:grpSpPr>
+      <p:sp>
+        <p:nvSpPr>
+          <p:cNvPr id="2" name="Content Placeholder 1"/>
+          <p:cNvSpPr>
+            <a:spLocks noGrp="1"/>
+          </p:cNvSpPr>
+          <p:nvPr>
+            <p:ph idx="1"/>
+          </p:nvPr>
+        </p:nvSpPr>
+        <p:spPr/>
+        <p:txBody>
+          <a:bodyPr>
+            <a:normAutofit/>
+          </a:bodyPr>
+          <a:lstStyle/>
+          <a:p>
+            <a:r>
+              <a:rPr lang="en-US" b="1" dirty="0" smtClean="0"/>
+              <a:t>Pros:</a:t>
+            </a:r>
+            <a:endParaRPr lang="en-US" b="1" dirty="0"/>
+          </a:p>
+          <a:p>
+            <a:pPr lvl="1"/>
+            <a:r>
+              <a:rPr lang="en-US" dirty="0"/>
+              <a:t>Loosely Coupled</a:t>
+            </a:r>
+          </a:p>
+          <a:p>
+            <a:pPr lvl="1"/>
+            <a:r>
+              <a:rPr lang="en-US" dirty="0"/>
+              <a:t>Much Better Testability</a:t>
+            </a:r>
+          </a:p>
+          <a:p>
+            <a:pPr lvl="1"/>
+            <a:r>
+              <a:rPr lang="en-US" dirty="0" smtClean="0"/>
+              <a:t>Separation </a:t>
+            </a:r>
+            <a:r>
+              <a:rPr lang="en-US" dirty="0"/>
+              <a:t>Of Concerns</a:t>
+            </a:r>
+          </a:p>
+          <a:p>
+            <a:r>
+              <a:rPr lang="en-US" b="1" dirty="0" smtClean="0"/>
+              <a:t>Cons:</a:t>
+            </a:r>
+            <a:endParaRPr lang="en-US" b="1" dirty="0"/>
+          </a:p>
+          <a:p>
+            <a:pPr lvl="1"/>
+            <a:r>
+              <a:rPr lang="en-US" dirty="0"/>
+              <a:t>Difficult to </a:t>
+            </a:r>
+            <a:r>
+              <a:rPr lang="en-US" b="1" u="sng" dirty="0" smtClean="0"/>
+              <a:t>understand</a:t>
+            </a:r>
+            <a:r>
+              <a:rPr lang="en-US" dirty="0"/>
+              <a:t>. </a:t>
+            </a:r>
+            <a:endParaRPr lang="en-US" dirty="0" smtClean="0"/>
+          </a:p>
+          <a:p>
+            <a:pPr lvl="1"/>
+            <a:r>
+              <a:rPr lang="en-US" dirty="0" smtClean="0"/>
+              <a:t>Increase </a:t>
+            </a:r>
+            <a:r>
+              <a:rPr lang="en-US" dirty="0"/>
+              <a:t>c</a:t>
+            </a:r>
+            <a:r>
+              <a:rPr lang="en-US" dirty="0" smtClean="0"/>
+              <a:t>ode complexity.</a:t>
+            </a:r>
+            <a:endParaRPr lang="en-US" dirty="0"/>
+          </a:p>
+          <a:p>
+            <a:pPr lvl="1"/>
+            <a:r>
+              <a:rPr lang="en-US" dirty="0" smtClean="0"/>
+              <a:t>Complicates Debugging &amp; Code Flow. </a:t>
+            </a:r>
+            <a:endParaRPr lang="en-US" dirty="0"/>
+          </a:p>
+        </p:txBody>
+      </p:sp>
+      <p:sp>
+        <p:nvSpPr>
+          <p:cNvPr id="3" name="Title 2"/>
+          <p:cNvSpPr>
+            <a:spLocks noGrp="1"/>
+          </p:cNvSpPr>
+          <p:nvPr>
+            <p:ph type="title"/>
+          </p:nvPr>
+        </p:nvSpPr>
+        <p:spPr/>
+        <p:txBody>
+          <a:bodyPr/>
+          <a:lstStyle/>
+          <a:p>
+            <a:r>
+              <a:rPr lang="en-US" dirty="0"/>
+              <a:t>Dependency Injection</a:t>
+            </a:r>
+          </a:p>
+        </p:txBody>
+      </p:sp>
+    </p:spTree>
+    <p:extLst>
+      <p:ext uri="{BB962C8B-B14F-4D97-AF65-F5344CB8AC3E}">
+        <p14:creationId xmlns:p14="http://schemas.microsoft.com/office/powerpoint/2010/main" val="3352475107"/>
+      </p:ext>
+    </p:extLst>
+  </p:cSld>
+  <p:clrMapOvr>
+    <a:masterClrMapping/>
+  </p:clrMapOvr>
+</p:sld>
+</file>
+
+<file path=ppt/slides/slide14.xml><?xml version="1.0" encoding="utf-8"?>
+<p:sld xmlns:a="http://schemas.openxmlformats.org/drawingml/2006/main" xmlns:r="http://schemas.openxmlformats.org/officeDocument/2006/relationships" xmlns:p="http://schemas.openxmlformats.org/presentationml/2006/main">
+  <p:cSld>
+    <p:spTree>
+      <p:nvGrpSpPr>
+        <p:cNvPr id="1" name=""/>
+        <p:cNvGrpSpPr/>
+        <p:nvPr/>
+      </p:nvGrpSpPr>
+      <p:grpSpPr>
+        <a:xfrm>
+          <a:off x="0" y="0"/>
+          <a:ext cx="0" cy="0"/>
+          <a:chOff x="0" y="0"/>
+          <a:chExt cx="0" cy="0"/>
+        </a:xfrm>
+      </p:grpSpPr>
+      <p:sp>
+        <p:nvSpPr>
+          <p:cNvPr id="2" name="Content Placeholder 1"/>
+          <p:cNvSpPr>
+            <a:spLocks noGrp="1"/>
+          </p:cNvSpPr>
+          <p:nvPr>
+            <p:ph idx="1"/>
+          </p:nvPr>
+        </p:nvSpPr>
+        <p:spPr/>
+        <p:txBody>
+          <a:bodyPr/>
+          <a:lstStyle/>
+          <a:p>
+            <a:r>
+              <a:rPr lang="en-US" b="1" dirty="0" smtClean="0"/>
+              <a:t>Spring MVC</a:t>
+            </a:r>
+            <a:r>
+              <a:rPr lang="en-US" dirty="0" smtClean="0"/>
+              <a:t>: a </a:t>
+            </a:r>
+            <a:r>
+              <a:rPr lang="en-US" dirty="0" smtClean="0"/>
+              <a:t>framework that supports MVC (Model-View-Controller) architecture to support web application developments. </a:t>
+            </a:r>
+          </a:p>
+          <a:p>
+            <a:r>
+              <a:rPr lang="en-US" dirty="0"/>
+              <a:t>Spring MVC </a:t>
+            </a:r>
+            <a:r>
+              <a:rPr lang="en-US" dirty="0" smtClean="0"/>
+              <a:t>is designed </a:t>
+            </a:r>
+            <a:r>
+              <a:rPr lang="en-US" dirty="0"/>
+              <a:t>around a </a:t>
+            </a:r>
+            <a:r>
+              <a:rPr lang="en-US" b="1" dirty="0"/>
+              <a:t>front controller </a:t>
+            </a:r>
+            <a:r>
+              <a:rPr lang="en-US" dirty="0"/>
+              <a:t>(</a:t>
+            </a:r>
+            <a:r>
+              <a:rPr lang="en-US" dirty="0" err="1"/>
+              <a:t>DispatcherServlet</a:t>
+            </a:r>
+            <a:r>
+              <a:rPr lang="en-US" dirty="0"/>
+              <a:t>).</a:t>
+            </a:r>
+          </a:p>
+          <a:p>
+            <a:endParaRPr lang="en-US" dirty="0"/>
+          </a:p>
+        </p:txBody>
+      </p:sp>
+      <p:sp>
+        <p:nvSpPr>
+          <p:cNvPr id="3" name="Title 2"/>
+          <p:cNvSpPr>
+            <a:spLocks noGrp="1"/>
+          </p:cNvSpPr>
+          <p:nvPr>
+            <p:ph type="title"/>
+          </p:nvPr>
+        </p:nvSpPr>
+        <p:spPr/>
+        <p:txBody>
+          <a:bodyPr/>
+          <a:lstStyle/>
+          <a:p>
+            <a:r>
+              <a:rPr lang="en-US" dirty="0"/>
+              <a:t>Spring MVC</a:t>
+            </a:r>
+          </a:p>
+        </p:txBody>
+      </p:sp>
+    </p:spTree>
+    <p:extLst>
+      <p:ext uri="{BB962C8B-B14F-4D97-AF65-F5344CB8AC3E}">
+        <p14:creationId xmlns:p14="http://schemas.microsoft.com/office/powerpoint/2010/main" val="2450254546"/>
+      </p:ext>
+    </p:extLst>
+  </p:cSld>
+  <p:clrMapOvr>
+    <a:masterClrMapping/>
+  </p:clrMapOvr>
+  <p:timing>
+    <p:tnLst>
+      <p:par>
+        <p:cTn id="1" dur="indefinite" restart="never" nodeType="tmRoot"/>
+      </p:par>
+    </p:tnLst>
+  </p:timing>
+</p:sld>
+</file>
+
+<file path=ppt/slides/slide15.xml><?xml version="1.0" encoding="utf-8"?>
 <p:sld xmlns:a="http://schemas.openxmlformats.org/drawingml/2006/main" xmlns:r="http://schemas.openxmlformats.org/officeDocument/2006/relationships" xmlns:p="http://schemas.openxmlformats.org/presentationml/2006/main">
   <p:cSld>
     <p:spTree>
@@ -4735,8 +5540,8 @@
         </p:blipFill>
         <p:spPr bwMode="auto">
           <a:xfrm>
-            <a:off x="2971800" y="1905000"/>
-            <a:ext cx="5899311" cy="4501858"/>
+            <a:off x="533401" y="1371599"/>
+            <a:ext cx="5867400" cy="4477507"/>
           </a:xfrm>
           <a:prstGeom prst="rect">
             <a:avLst/>
@@ -4755,80 +5560,295 @@
       </p:pic>
       <p:sp>
         <p:nvSpPr>
-          <p:cNvPr id="2" name="Content Placeholder 1"/>
-          <p:cNvSpPr>
-            <a:spLocks noGrp="1"/>
-          </p:cNvSpPr>
-          <p:nvPr>
-            <p:ph idx="1"/>
-          </p:nvPr>
+          <p:cNvPr id="3" name="Title 2"/>
+          <p:cNvSpPr>
+            <a:spLocks noGrp="1"/>
+          </p:cNvSpPr>
+          <p:nvPr>
+            <p:ph type="title"/>
+          </p:nvPr>
+        </p:nvSpPr>
+        <p:spPr/>
+        <p:txBody>
+          <a:bodyPr/>
+          <a:lstStyle/>
+          <a:p>
+            <a:r>
+              <a:rPr lang="en-US" dirty="0" smtClean="0"/>
+              <a:t>Spring MVC</a:t>
+            </a:r>
+            <a:endParaRPr lang="en-US" dirty="0"/>
+          </a:p>
+        </p:txBody>
+      </p:sp>
+      <p:sp>
+        <p:nvSpPr>
+          <p:cNvPr id="6" name="Rounded Rectangular Callout 5"/>
+          <p:cNvSpPr/>
+          <p:nvPr/>
         </p:nvSpPr>
         <p:spPr>
           <a:xfrm>
-            <a:off x="472952" y="1458349"/>
-            <a:ext cx="4632448" cy="5100907"/>
+            <a:off x="7010400" y="1143000"/>
+            <a:ext cx="2062316" cy="914400"/>
           </a:xfrm>
+          <a:prstGeom prst="wedgeRoundRectCallout">
+            <a:avLst>
+              <a:gd name="adj1" fmla="val -83654"/>
+              <a:gd name="adj2" fmla="val 30403"/>
+              <a:gd name="adj3" fmla="val 16667"/>
+            </a:avLst>
+          </a:prstGeom>
         </p:spPr>
-        <p:txBody>
-          <a:bodyPr>
-            <a:normAutofit/>
-          </a:bodyPr>
+        <p:style>
+          <a:lnRef idx="2">
+            <a:schemeClr val="accent6"/>
+          </a:lnRef>
+          <a:fillRef idx="1">
+            <a:schemeClr val="lt1"/>
+          </a:fillRef>
+          <a:effectRef idx="0">
+            <a:schemeClr val="accent6"/>
+          </a:effectRef>
+          <a:fontRef idx="minor">
+            <a:schemeClr val="dk1"/>
+          </a:fontRef>
+        </p:style>
+        <p:txBody>
+          <a:bodyPr rtlCol="0" anchor="ctr"/>
           <a:lstStyle/>
           <a:p>
-            <a:r>
-              <a:rPr lang="en-US" dirty="0" smtClean="0"/>
-              <a:t>Handler Mapping: map request to a </a:t>
+            <a:pPr algn="ctr"/>
+            <a:r>
+              <a:rPr lang="en-US" dirty="0" smtClean="0"/>
+              <a:t>Map </a:t>
+            </a:r>
+            <a:r>
+              <a:rPr lang="en-US" b="1" dirty="0" smtClean="0"/>
+              <a:t>Request</a:t>
+            </a:r>
+            <a:r>
+              <a:rPr lang="en-US" dirty="0" smtClean="0"/>
+              <a:t> to </a:t>
             </a:r>
             <a:r>
               <a:rPr lang="en-US" b="1" dirty="0" smtClean="0"/>
               <a:t>Controller</a:t>
             </a:r>
-          </a:p>
-          <a:p>
-            <a:r>
-              <a:rPr lang="en-US" dirty="0" err="1" smtClean="0"/>
-              <a:t>ModelAndView</a:t>
-            </a:r>
-            <a:r>
-              <a:rPr lang="en-US" dirty="0" smtClean="0"/>
-              <a:t>: holder for both Model and View</a:t>
-            </a:r>
-          </a:p>
-          <a:p>
-            <a:r>
-              <a:rPr lang="en-US" dirty="0" smtClean="0"/>
-              <a:t>View Resolver: map view name to a </a:t>
+            <a:endParaRPr lang="en-US" b="1" dirty="0"/>
+          </a:p>
+        </p:txBody>
+      </p:sp>
+      <p:sp>
+        <p:nvSpPr>
+          <p:cNvPr id="8" name="Rounded Rectangular Callout 7"/>
+          <p:cNvSpPr/>
+          <p:nvPr/>
+        </p:nvSpPr>
+        <p:spPr>
+          <a:xfrm>
+            <a:off x="6776884" y="3913239"/>
+            <a:ext cx="2295832" cy="914400"/>
+          </a:xfrm>
+          <a:prstGeom prst="wedgeRoundRectCallout">
+            <a:avLst>
+              <a:gd name="adj1" fmla="val -137967"/>
+              <a:gd name="adj2" fmla="val -42339"/>
+              <a:gd name="adj3" fmla="val 16667"/>
+            </a:avLst>
+          </a:prstGeom>
+        </p:spPr>
+        <p:style>
+          <a:lnRef idx="2">
+            <a:schemeClr val="dk1"/>
+          </a:lnRef>
+          <a:fillRef idx="1">
+            <a:schemeClr val="lt1"/>
+          </a:fillRef>
+          <a:effectRef idx="0">
+            <a:schemeClr val="dk1"/>
+          </a:effectRef>
+          <a:fontRef idx="minor">
+            <a:schemeClr val="dk1"/>
+          </a:fontRef>
+        </p:style>
+        <p:txBody>
+          <a:bodyPr rtlCol="0" anchor="ctr"/>
+          <a:lstStyle/>
+          <a:p>
+            <a:pPr algn="ctr"/>
+            <a:r>
+              <a:rPr lang="en-US" dirty="0" smtClean="0"/>
+              <a:t>Holder </a:t>
+            </a:r>
+            <a:r>
+              <a:rPr lang="en-US" dirty="0"/>
+              <a:t>for both </a:t>
+            </a:r>
+            <a:r>
+              <a:rPr lang="en-US" b="1" dirty="0"/>
+              <a:t>Model</a:t>
+            </a:r>
+            <a:r>
+              <a:rPr lang="en-US" dirty="0"/>
+              <a:t> and </a:t>
             </a:r>
             <a:r>
               <a:rPr lang="en-US" b="1" dirty="0" smtClean="0"/>
               <a:t>View</a:t>
             </a:r>
+            <a:endParaRPr lang="en-US" b="1" dirty="0"/>
+          </a:p>
+        </p:txBody>
+      </p:sp>
+      <p:sp>
+        <p:nvSpPr>
+          <p:cNvPr id="10" name="Rounded Rectangular Callout 9"/>
+          <p:cNvSpPr/>
+          <p:nvPr/>
+        </p:nvSpPr>
+        <p:spPr>
+          <a:xfrm>
+            <a:off x="6629400" y="5257800"/>
+            <a:ext cx="2443316" cy="762000"/>
+          </a:xfrm>
+          <a:prstGeom prst="wedgeRoundRectCallout">
+            <a:avLst>
+              <a:gd name="adj1" fmla="val -62791"/>
+              <a:gd name="adj2" fmla="val -28225"/>
+              <a:gd name="adj3" fmla="val 16667"/>
+            </a:avLst>
+          </a:prstGeom>
+        </p:spPr>
+        <p:style>
+          <a:lnRef idx="2">
+            <a:schemeClr val="accent3"/>
+          </a:lnRef>
+          <a:fillRef idx="1">
+            <a:schemeClr val="lt1"/>
+          </a:fillRef>
+          <a:effectRef idx="0">
+            <a:schemeClr val="accent3"/>
+          </a:effectRef>
+          <a:fontRef idx="minor">
+            <a:schemeClr val="dk1"/>
+          </a:fontRef>
+        </p:style>
+        <p:txBody>
+          <a:bodyPr rtlCol="0" anchor="ctr"/>
+          <a:lstStyle/>
+          <a:p>
+            <a:pPr algn="ctr"/>
+            <a:r>
+              <a:rPr lang="en-US" dirty="0" smtClean="0"/>
+              <a:t>Map </a:t>
+            </a:r>
+            <a:r>
+              <a:rPr lang="en-US" b="1" dirty="0" smtClean="0"/>
+              <a:t>View Name </a:t>
+            </a:r>
+            <a:r>
+              <a:rPr lang="en-US" dirty="0"/>
+              <a:t>to </a:t>
+            </a:r>
+            <a:r>
+              <a:rPr lang="en-US" b="1" dirty="0" smtClean="0"/>
+              <a:t>View</a:t>
+            </a:r>
             <a:endParaRPr lang="en-US" dirty="0"/>
           </a:p>
         </p:txBody>
       </p:sp>
       <p:sp>
         <p:nvSpPr>
-          <p:cNvPr id="3" name="Title 2"/>
-          <p:cNvSpPr>
-            <a:spLocks noGrp="1"/>
-          </p:cNvSpPr>
-          <p:nvPr>
-            <p:ph type="title"/>
-          </p:nvPr>
-        </p:nvSpPr>
-        <p:spPr/>
-        <p:txBody>
-          <a:bodyPr/>
+          <p:cNvPr id="11" name="Rounded Rectangular Callout 10"/>
+          <p:cNvSpPr/>
+          <p:nvPr/>
+        </p:nvSpPr>
+        <p:spPr>
+          <a:xfrm>
+            <a:off x="762000" y="1600200"/>
+            <a:ext cx="2514600" cy="685800"/>
+          </a:xfrm>
+          <a:prstGeom prst="wedgeRoundRectCallout">
+            <a:avLst>
+              <a:gd name="adj1" fmla="val 30164"/>
+              <a:gd name="adj2" fmla="val 187628"/>
+              <a:gd name="adj3" fmla="val 16667"/>
+            </a:avLst>
+          </a:prstGeom>
+        </p:spPr>
+        <p:style>
+          <a:lnRef idx="2">
+            <a:schemeClr val="accent4"/>
+          </a:lnRef>
+          <a:fillRef idx="1">
+            <a:schemeClr val="lt1"/>
+          </a:fillRef>
+          <a:effectRef idx="0">
+            <a:schemeClr val="accent4"/>
+          </a:effectRef>
+          <a:fontRef idx="minor">
+            <a:schemeClr val="dk1"/>
+          </a:fontRef>
+        </p:style>
+        <p:txBody>
+          <a:bodyPr rtlCol="0" anchor="ctr"/>
           <a:lstStyle/>
           <a:p>
-            <a:r>
-              <a:rPr lang="en-US" dirty="0" smtClean="0"/>
-              <a:t>Spring </a:t>
-            </a:r>
-            <a:r>
-              <a:rPr lang="en-US" dirty="0" smtClean="0"/>
-              <a:t>MVC</a:t>
+            <a:pPr algn="ctr"/>
+            <a:r>
+              <a:rPr lang="en-US" dirty="0" smtClean="0"/>
+              <a:t>Dispatch requests </a:t>
+            </a:r>
+            <a:r>
+              <a:rPr lang="en-US" dirty="0"/>
+              <a:t>to handlers.</a:t>
+            </a:r>
+          </a:p>
+        </p:txBody>
+      </p:sp>
+      <p:sp>
+        <p:nvSpPr>
+          <p:cNvPr id="4" name="Rounded Rectangular Callout 3"/>
+          <p:cNvSpPr/>
+          <p:nvPr/>
+        </p:nvSpPr>
+        <p:spPr>
+          <a:xfrm>
+            <a:off x="2971800" y="5973690"/>
+            <a:ext cx="1905000" cy="685800"/>
+          </a:xfrm>
+          <a:prstGeom prst="wedgeRoundRectCallout">
+            <a:avLst>
+              <a:gd name="adj1" fmla="val -37714"/>
+              <a:gd name="adj2" fmla="val -115375"/>
+              <a:gd name="adj3" fmla="val 16667"/>
+            </a:avLst>
+          </a:prstGeom>
+        </p:spPr>
+        <p:style>
+          <a:lnRef idx="2">
+            <a:schemeClr val="accent6"/>
+          </a:lnRef>
+          <a:fillRef idx="1">
+            <a:schemeClr val="lt1"/>
+          </a:fillRef>
+          <a:effectRef idx="0">
+            <a:schemeClr val="accent6"/>
+          </a:effectRef>
+          <a:fontRef idx="minor">
+            <a:schemeClr val="dk1"/>
+          </a:fontRef>
+        </p:style>
+        <p:txBody>
+          <a:bodyPr rtlCol="0" anchor="ctr"/>
+          <a:lstStyle/>
+          <a:p>
+            <a:pPr algn="ctr"/>
+            <a:r>
+              <a:rPr lang="en-US" dirty="0" smtClean="0"/>
+              <a:t>Usually a JSP page</a:t>
             </a:r>
             <a:endParaRPr lang="en-US" dirty="0"/>
           </a:p>
@@ -4838,669 +5858,6 @@
     <p:extLst>
       <p:ext uri="{BB962C8B-B14F-4D97-AF65-F5344CB8AC3E}">
         <p14:creationId xmlns:p14="http://schemas.microsoft.com/office/powerpoint/2010/main" val="1290186735"/>
-      </p:ext>
-    </p:extLst>
-  </p:cSld>
-  <p:clrMapOvr>
-    <a:masterClrMapping/>
-  </p:clrMapOvr>
-  <p:timing>
-    <p:tnLst>
-      <p:par>
-        <p:cTn id="1" dur="indefinite" restart="never" nodeType="tmRoot"/>
-      </p:par>
-    </p:tnLst>
-  </p:timing>
-</p:sld>
-</file>
-
-<file path=ppt/slides/slide11.xml><?xml version="1.0" encoding="utf-8"?>
-<p:sld xmlns:a="http://schemas.openxmlformats.org/drawingml/2006/main" xmlns:r="http://schemas.openxmlformats.org/officeDocument/2006/relationships" xmlns:p="http://schemas.openxmlformats.org/presentationml/2006/main">
-  <p:cSld>
-    <p:spTree>
-      <p:nvGrpSpPr>
-        <p:cNvPr id="1" name=""/>
-        <p:cNvGrpSpPr/>
-        <p:nvPr/>
-      </p:nvGrpSpPr>
-      <p:grpSpPr>
-        <a:xfrm>
-          <a:off x="0" y="0"/>
-          <a:ext cx="0" cy="0"/>
-          <a:chOff x="0" y="0"/>
-          <a:chExt cx="0" cy="0"/>
-        </a:xfrm>
-      </p:grpSpPr>
-      <p:sp>
-        <p:nvSpPr>
-          <p:cNvPr id="4" name="Title 3"/>
-          <p:cNvSpPr>
-            <a:spLocks noGrp="1"/>
-          </p:cNvSpPr>
-          <p:nvPr>
-            <p:ph type="title"/>
-          </p:nvPr>
-        </p:nvSpPr>
-        <p:spPr/>
-        <p:txBody>
-          <a:bodyPr/>
-          <a:lstStyle/>
-          <a:p>
-            <a:r>
-              <a:rPr lang="en-US" dirty="0" smtClean="0"/>
-              <a:t>Hibernate</a:t>
-            </a:r>
-            <a:endParaRPr lang="en-US" dirty="0"/>
-          </a:p>
-        </p:txBody>
-      </p:sp>
-      <p:sp>
-        <p:nvSpPr>
-          <p:cNvPr id="5" name="Text Placeholder 4"/>
-          <p:cNvSpPr>
-            <a:spLocks noGrp="1"/>
-          </p:cNvSpPr>
-          <p:nvPr>
-            <p:ph type="body" idx="1"/>
-          </p:nvPr>
-        </p:nvSpPr>
-        <p:spPr/>
-        <p:txBody>
-          <a:bodyPr/>
-          <a:lstStyle/>
-          <a:p>
-            <a:endParaRPr lang="en-US" dirty="0"/>
-          </a:p>
-        </p:txBody>
-      </p:sp>
-    </p:spTree>
-    <p:extLst>
-      <p:ext uri="{BB962C8B-B14F-4D97-AF65-F5344CB8AC3E}">
-        <p14:creationId xmlns:p14="http://schemas.microsoft.com/office/powerpoint/2010/main" val="3748602081"/>
-      </p:ext>
-    </p:extLst>
-  </p:cSld>
-  <p:clrMapOvr>
-    <a:masterClrMapping/>
-  </p:clrMapOvr>
-  <p:timing>
-    <p:tnLst>
-      <p:par>
-        <p:cTn id="1" dur="indefinite" restart="never" nodeType="tmRoot"/>
-      </p:par>
-    </p:tnLst>
-  </p:timing>
-</p:sld>
-</file>
-
-<file path=ppt/slides/slide12.xml><?xml version="1.0" encoding="utf-8"?>
-<p:sld xmlns:a="http://schemas.openxmlformats.org/drawingml/2006/main" xmlns:r="http://schemas.openxmlformats.org/officeDocument/2006/relationships" xmlns:p="http://schemas.openxmlformats.org/presentationml/2006/main">
-  <p:cSld>
-    <p:spTree>
-      <p:nvGrpSpPr>
-        <p:cNvPr id="1" name=""/>
-        <p:cNvGrpSpPr/>
-        <p:nvPr/>
-      </p:nvGrpSpPr>
-      <p:grpSpPr>
-        <a:xfrm>
-          <a:off x="0" y="0"/>
-          <a:ext cx="0" cy="0"/>
-          <a:chOff x="0" y="0"/>
-          <a:chExt cx="0" cy="0"/>
-        </a:xfrm>
-      </p:grpSpPr>
-      <p:sp>
-        <p:nvSpPr>
-          <p:cNvPr id="2" name="Content Placeholder 1"/>
-          <p:cNvSpPr>
-            <a:spLocks noGrp="1"/>
-          </p:cNvSpPr>
-          <p:nvPr>
-            <p:ph idx="1"/>
-          </p:nvPr>
-        </p:nvSpPr>
-        <p:spPr/>
-        <p:txBody>
-          <a:bodyPr/>
-          <a:lstStyle/>
-          <a:p>
-            <a:r>
-              <a:rPr lang="en-US" b="1" dirty="0" smtClean="0"/>
-              <a:t>Hibernate ORM</a:t>
-            </a:r>
-            <a:r>
-              <a:rPr lang="en-US" dirty="0" smtClean="0"/>
-              <a:t> (</a:t>
-            </a:r>
-            <a:r>
-              <a:rPr lang="en-US" b="1" dirty="0" smtClean="0"/>
-              <a:t>Hibernate</a:t>
-            </a:r>
-            <a:r>
-              <a:rPr lang="en-US" dirty="0" smtClean="0"/>
-              <a:t>) is an </a:t>
-            </a:r>
-            <a:r>
-              <a:rPr lang="en-US" b="1" dirty="0" smtClean="0"/>
-              <a:t>ORM</a:t>
-            </a:r>
-            <a:r>
-              <a:rPr lang="en-US" dirty="0"/>
-              <a:t> and persistence framework </a:t>
-            </a:r>
-            <a:r>
-              <a:rPr lang="en-US" dirty="0" smtClean="0"/>
-              <a:t>that allows mapping between objects (even POJOs) and database.</a:t>
-            </a:r>
-          </a:p>
-        </p:txBody>
-      </p:sp>
-      <p:sp>
-        <p:nvSpPr>
-          <p:cNvPr id="3" name="Title 2"/>
-          <p:cNvSpPr>
-            <a:spLocks noGrp="1"/>
-          </p:cNvSpPr>
-          <p:nvPr>
-            <p:ph type="title"/>
-          </p:nvPr>
-        </p:nvSpPr>
-        <p:spPr/>
-        <p:txBody>
-          <a:bodyPr/>
-          <a:lstStyle/>
-          <a:p>
-            <a:r>
-              <a:rPr lang="en-US" dirty="0" smtClean="0"/>
-              <a:t>Hibernate</a:t>
-            </a:r>
-            <a:endParaRPr lang="en-US" dirty="0"/>
-          </a:p>
-        </p:txBody>
-      </p:sp>
-      <p:pic>
-        <p:nvPicPr>
-          <p:cNvPr id="2050" name="Picture 2" descr="C:\Users\HuanPM\Desktop\hibernate_position.jpg"/>
-          <p:cNvPicPr>
-            <a:picLocks noChangeAspect="1" noChangeArrowheads="1"/>
-          </p:cNvPicPr>
-          <p:nvPr/>
-        </p:nvPicPr>
-        <p:blipFill>
-          <a:blip r:embed="rId2">
-            <a:extLst>
-              <a:ext uri="{28A0092B-C50C-407E-A947-70E740481C1C}">
-                <a14:useLocalDpi xmlns:a14="http://schemas.microsoft.com/office/drawing/2010/main" val="0"/>
-              </a:ext>
-            </a:extLst>
-          </a:blip>
-          <a:srcRect/>
-          <a:stretch>
-            <a:fillRect/>
-          </a:stretch>
-        </p:blipFill>
-        <p:spPr bwMode="auto">
-          <a:xfrm>
-            <a:off x="762000" y="3200400"/>
-            <a:ext cx="7478091" cy="2209800"/>
-          </a:xfrm>
-          <a:prstGeom prst="rect">
-            <a:avLst/>
-          </a:prstGeom>
-          <a:noFill/>
-          <a:extLst>
-            <a:ext uri="{909E8E84-426E-40DD-AFC4-6F175D3DCCD1}">
-              <a14:hiddenFill xmlns:a14="http://schemas.microsoft.com/office/drawing/2010/main">
-                <a:solidFill>
-                  <a:srgbClr val="FFFFFF"/>
-                </a:solidFill>
-              </a14:hiddenFill>
-            </a:ext>
-          </a:extLst>
-        </p:spPr>
-      </p:pic>
-    </p:spTree>
-    <p:extLst>
-      <p:ext uri="{BB962C8B-B14F-4D97-AF65-F5344CB8AC3E}">
-        <p14:creationId xmlns:p14="http://schemas.microsoft.com/office/powerpoint/2010/main" val="271674682"/>
-      </p:ext>
-    </p:extLst>
-  </p:cSld>
-  <p:clrMapOvr>
-    <a:masterClrMapping/>
-  </p:clrMapOvr>
-  <p:timing>
-    <p:tnLst>
-      <p:par>
-        <p:cTn id="1" dur="indefinite" restart="never" nodeType="tmRoot"/>
-      </p:par>
-    </p:tnLst>
-  </p:timing>
-</p:sld>
-</file>
-
-<file path=ppt/slides/slide13.xml><?xml version="1.0" encoding="utf-8"?>
-<p:sld xmlns:a="http://schemas.openxmlformats.org/drawingml/2006/main" xmlns:r="http://schemas.openxmlformats.org/officeDocument/2006/relationships" xmlns:p="http://schemas.openxmlformats.org/presentationml/2006/main">
-  <p:cSld>
-    <p:spTree>
-      <p:nvGrpSpPr>
-        <p:cNvPr id="1" name=""/>
-        <p:cNvGrpSpPr/>
-        <p:nvPr/>
-      </p:nvGrpSpPr>
-      <p:grpSpPr>
-        <a:xfrm>
-          <a:off x="0" y="0"/>
-          <a:ext cx="0" cy="0"/>
-          <a:chOff x="0" y="0"/>
-          <a:chExt cx="0" cy="0"/>
-        </a:xfrm>
-      </p:grpSpPr>
-      <p:sp>
-        <p:nvSpPr>
-          <p:cNvPr id="2" name="Content Placeholder 1"/>
-          <p:cNvSpPr>
-            <a:spLocks noGrp="1"/>
-          </p:cNvSpPr>
-          <p:nvPr>
-            <p:ph idx="1"/>
-          </p:nvPr>
-        </p:nvSpPr>
-        <p:spPr/>
-        <p:txBody>
-          <a:bodyPr/>
-          <a:lstStyle/>
-          <a:p>
-            <a:r>
-              <a:rPr lang="en-US" dirty="0" smtClean="0"/>
-              <a:t>Hibernate uses HQL (Hibernate Query Language) to query Hibernate objects.</a:t>
-            </a:r>
-          </a:p>
-          <a:p>
-            <a:r>
-              <a:rPr lang="en-US" dirty="0" smtClean="0"/>
-              <a:t>Hibernate </a:t>
-            </a:r>
-            <a:r>
-              <a:rPr lang="en-US" dirty="0" smtClean="0"/>
-              <a:t>generates </a:t>
-            </a:r>
-            <a:r>
-              <a:rPr lang="en-US" dirty="0" smtClean="0"/>
-              <a:t>database-specific </a:t>
-            </a:r>
-            <a:r>
-              <a:rPr lang="en-US" dirty="0" smtClean="0"/>
-              <a:t>SQL </a:t>
-            </a:r>
-            <a:r>
-              <a:rPr lang="en-US" dirty="0" smtClean="0"/>
-              <a:t>queries based on dialect configuration.</a:t>
-            </a:r>
-            <a:endParaRPr lang="en-US" dirty="0"/>
-          </a:p>
-        </p:txBody>
-      </p:sp>
-      <p:sp>
-        <p:nvSpPr>
-          <p:cNvPr id="3" name="Title 2"/>
-          <p:cNvSpPr>
-            <a:spLocks noGrp="1"/>
-          </p:cNvSpPr>
-          <p:nvPr>
-            <p:ph type="title"/>
-          </p:nvPr>
-        </p:nvSpPr>
-        <p:spPr/>
-        <p:txBody>
-          <a:bodyPr/>
-          <a:lstStyle/>
-          <a:p>
-            <a:r>
-              <a:rPr lang="en-US" dirty="0" smtClean="0"/>
-              <a:t>Hibernate</a:t>
-            </a:r>
-            <a:endParaRPr lang="en-US" dirty="0"/>
-          </a:p>
-        </p:txBody>
-      </p:sp>
-    </p:spTree>
-    <p:extLst>
-      <p:ext uri="{BB962C8B-B14F-4D97-AF65-F5344CB8AC3E}">
-        <p14:creationId xmlns:p14="http://schemas.microsoft.com/office/powerpoint/2010/main" val="2278853552"/>
-      </p:ext>
-    </p:extLst>
-  </p:cSld>
-  <p:clrMapOvr>
-    <a:masterClrMapping/>
-  </p:clrMapOvr>
-  <p:timing>
-    <p:tnLst>
-      <p:par>
-        <p:cTn id="1" dur="indefinite" restart="never" nodeType="tmRoot"/>
-      </p:par>
-    </p:tnLst>
-  </p:timing>
-</p:sld>
-</file>
-
-<file path=ppt/slides/slide14.xml><?xml version="1.0" encoding="utf-8"?>
-<p:sld xmlns:a="http://schemas.openxmlformats.org/drawingml/2006/main" xmlns:r="http://schemas.openxmlformats.org/officeDocument/2006/relationships" xmlns:p="http://schemas.openxmlformats.org/presentationml/2006/main">
-  <p:cSld>
-    <p:spTree>
-      <p:nvGrpSpPr>
-        <p:cNvPr id="1" name=""/>
-        <p:cNvGrpSpPr/>
-        <p:nvPr/>
-      </p:nvGrpSpPr>
-      <p:grpSpPr>
-        <a:xfrm>
-          <a:off x="0" y="0"/>
-          <a:ext cx="0" cy="0"/>
-          <a:chOff x="0" y="0"/>
-          <a:chExt cx="0" cy="0"/>
-        </a:xfrm>
-      </p:grpSpPr>
-      <p:pic>
-        <p:nvPicPr>
-          <p:cNvPr id="3074" name="Picture 2" descr="C:\Users\HuanPM\Desktop\61dYc.png"/>
-          <p:cNvPicPr>
-            <a:picLocks noChangeAspect="1" noChangeArrowheads="1"/>
-          </p:cNvPicPr>
-          <p:nvPr/>
-        </p:nvPicPr>
-        <p:blipFill>
-          <a:blip r:embed="rId2">
-            <a:extLst>
-              <a:ext uri="{28A0092B-C50C-407E-A947-70E740481C1C}">
-                <a14:useLocalDpi xmlns:a14="http://schemas.microsoft.com/office/drawing/2010/main" val="0"/>
-              </a:ext>
-            </a:extLst>
-          </a:blip>
-          <a:srcRect/>
-          <a:stretch>
-            <a:fillRect/>
-          </a:stretch>
-        </p:blipFill>
-        <p:spPr bwMode="auto">
-          <a:xfrm>
-            <a:off x="5029200" y="914400"/>
-            <a:ext cx="3835685" cy="3200400"/>
-          </a:xfrm>
-          <a:prstGeom prst="rect">
-            <a:avLst/>
-          </a:prstGeom>
-          <a:noFill/>
-          <a:extLst>
-            <a:ext uri="{909E8E84-426E-40DD-AFC4-6F175D3DCCD1}">
-              <a14:hiddenFill xmlns:a14="http://schemas.microsoft.com/office/drawing/2010/main">
-                <a:solidFill>
-                  <a:srgbClr val="FFFFFF"/>
-                </a:solidFill>
-              </a14:hiddenFill>
-            </a:ext>
-          </a:extLst>
-        </p:spPr>
-      </p:pic>
-      <p:sp>
-        <p:nvSpPr>
-          <p:cNvPr id="2" name="Content Placeholder 1"/>
-          <p:cNvSpPr>
-            <a:spLocks noGrp="1"/>
-          </p:cNvSpPr>
-          <p:nvPr>
-            <p:ph idx="1"/>
-          </p:nvPr>
-        </p:nvSpPr>
-        <p:spPr>
-          <a:xfrm>
-            <a:off x="533400" y="1524000"/>
-            <a:ext cx="5867400" cy="4525963"/>
-          </a:xfrm>
-        </p:spPr>
-        <p:txBody>
-          <a:bodyPr/>
-          <a:lstStyle/>
-          <a:p>
-            <a:r>
-              <a:rPr lang="en-US" dirty="0" smtClean="0"/>
-              <a:t>Hibernate object states:</a:t>
-            </a:r>
-          </a:p>
-          <a:p>
-            <a:pPr lvl="1"/>
-            <a:r>
-              <a:rPr lang="en-US" i="1" dirty="0"/>
-              <a:t>Transient</a:t>
-            </a:r>
-            <a:r>
-              <a:rPr lang="en-US" dirty="0"/>
-              <a:t> </a:t>
-            </a:r>
-            <a:r>
-              <a:rPr lang="en-US" dirty="0" smtClean="0"/>
-              <a:t>: has just been instantiated and not associated with a Session.</a:t>
-            </a:r>
-          </a:p>
-          <a:p>
-            <a:pPr lvl="1"/>
-            <a:r>
-              <a:rPr lang="en-US" i="1" dirty="0"/>
-              <a:t>Persistent</a:t>
-            </a:r>
-            <a:r>
-              <a:rPr lang="en-US" dirty="0"/>
-              <a:t> </a:t>
-            </a:r>
-            <a:r>
-              <a:rPr lang="en-US" dirty="0" smtClean="0"/>
-              <a:t>: is associated </a:t>
-            </a:r>
-            <a:r>
-              <a:rPr lang="en-US" dirty="0"/>
-              <a:t>with a </a:t>
-            </a:r>
-            <a:r>
-              <a:rPr lang="en-US" dirty="0" smtClean="0"/>
-              <a:t>Session and has an identifier value.</a:t>
-            </a:r>
-          </a:p>
-          <a:p>
-            <a:pPr lvl="1"/>
-            <a:r>
-              <a:rPr lang="en-US" i="1" dirty="0" smtClean="0"/>
-              <a:t>Detached</a:t>
-            </a:r>
-            <a:r>
-              <a:rPr lang="en-US" dirty="0" smtClean="0"/>
-              <a:t> : has been </a:t>
-            </a:r>
-            <a:r>
-              <a:rPr lang="en-US" i="1" dirty="0" smtClean="0"/>
-              <a:t>persistent</a:t>
-            </a:r>
-            <a:r>
-              <a:rPr lang="en-US" dirty="0"/>
-              <a:t> </a:t>
-            </a:r>
-            <a:r>
-              <a:rPr lang="en-US" dirty="0" smtClean="0"/>
-              <a:t>but its Session has been closed.</a:t>
-            </a:r>
-            <a:endParaRPr lang="en-US" dirty="0"/>
-          </a:p>
-        </p:txBody>
-      </p:sp>
-      <p:sp>
-        <p:nvSpPr>
-          <p:cNvPr id="3" name="Title 2"/>
-          <p:cNvSpPr>
-            <a:spLocks noGrp="1"/>
-          </p:cNvSpPr>
-          <p:nvPr>
-            <p:ph type="title"/>
-          </p:nvPr>
-        </p:nvSpPr>
-        <p:spPr/>
-        <p:txBody>
-          <a:bodyPr/>
-          <a:lstStyle/>
-          <a:p>
-            <a:r>
-              <a:rPr lang="en-US" dirty="0"/>
-              <a:t>Hibernate</a:t>
-            </a:r>
-          </a:p>
-        </p:txBody>
-      </p:sp>
-    </p:spTree>
-    <p:extLst>
-      <p:ext uri="{BB962C8B-B14F-4D97-AF65-F5344CB8AC3E}">
-        <p14:creationId xmlns:p14="http://schemas.microsoft.com/office/powerpoint/2010/main" val="3642476730"/>
-      </p:ext>
-    </p:extLst>
-  </p:cSld>
-  <p:clrMapOvr>
-    <a:masterClrMapping/>
-  </p:clrMapOvr>
-  <p:timing>
-    <p:tnLst>
-      <p:par>
-        <p:cTn id="1" dur="indefinite" restart="never" nodeType="tmRoot"/>
-      </p:par>
-    </p:tnLst>
-  </p:timing>
-</p:sld>
-</file>
-
-<file path=ppt/slides/slide15.xml><?xml version="1.0" encoding="utf-8"?>
-<p:sld xmlns:a="http://schemas.openxmlformats.org/drawingml/2006/main" xmlns:r="http://schemas.openxmlformats.org/officeDocument/2006/relationships" xmlns:p="http://schemas.openxmlformats.org/presentationml/2006/main">
-  <p:cSld>
-    <p:spTree>
-      <p:nvGrpSpPr>
-        <p:cNvPr id="1" name=""/>
-        <p:cNvGrpSpPr/>
-        <p:nvPr/>
-      </p:nvGrpSpPr>
-      <p:grpSpPr>
-        <a:xfrm>
-          <a:off x="0" y="0"/>
-          <a:ext cx="0" cy="0"/>
-          <a:chOff x="0" y="0"/>
-          <a:chExt cx="0" cy="0"/>
-        </a:xfrm>
-      </p:grpSpPr>
-      <p:sp>
-        <p:nvSpPr>
-          <p:cNvPr id="2" name="Content Placeholder 1"/>
-          <p:cNvSpPr>
-            <a:spLocks noGrp="1"/>
-          </p:cNvSpPr>
-          <p:nvPr>
-            <p:ph idx="1"/>
-          </p:nvPr>
-        </p:nvSpPr>
-        <p:spPr/>
-        <p:txBody>
-          <a:bodyPr/>
-          <a:lstStyle/>
-          <a:p>
-            <a:r>
-              <a:rPr lang="en-US" dirty="0" smtClean="0"/>
-              <a:t>Pros</a:t>
-            </a:r>
-            <a:r>
-              <a:rPr lang="en-US" dirty="0" smtClean="0"/>
-              <a:t>:</a:t>
-            </a:r>
-          </a:p>
-          <a:p>
-            <a:pPr lvl="1"/>
-            <a:r>
-              <a:rPr lang="en-US" dirty="0" smtClean="0"/>
-              <a:t>Work with java objects =&gt; more familiar.</a:t>
-            </a:r>
-            <a:endParaRPr lang="en-US" dirty="0" smtClean="0"/>
-          </a:p>
-          <a:p>
-            <a:pPr lvl="1"/>
-            <a:r>
-              <a:rPr lang="en-US" dirty="0" smtClean="0"/>
-              <a:t>Simplify CRUD operation programming.</a:t>
-            </a:r>
-          </a:p>
-          <a:p>
-            <a:pPr lvl="1"/>
-            <a:r>
-              <a:rPr lang="en-US" dirty="0" smtClean="0"/>
-              <a:t>Database independent. =&gt; No SQL queries is required.</a:t>
-            </a:r>
-          </a:p>
-          <a:p>
-            <a:pPr lvl="1"/>
-            <a:r>
-              <a:rPr lang="en-US" dirty="0" smtClean="0"/>
-              <a:t>Support cache.</a:t>
-            </a:r>
-          </a:p>
-          <a:p>
-            <a:r>
-              <a:rPr lang="en-US" dirty="0"/>
-              <a:t>Cons</a:t>
-            </a:r>
-            <a:r>
-              <a:rPr lang="en-US" dirty="0" smtClean="0"/>
-              <a:t>:</a:t>
-            </a:r>
-          </a:p>
-          <a:p>
-            <a:pPr lvl="1"/>
-            <a:r>
-              <a:rPr lang="en-US" dirty="0" smtClean="0"/>
-              <a:t>Lots of APIs =&gt; Hard to learn.</a:t>
-            </a:r>
-          </a:p>
-          <a:p>
-            <a:pPr lvl="1"/>
-            <a:r>
-              <a:rPr lang="en-US" dirty="0" smtClean="0"/>
-              <a:t>Not suitable for Batch processing.</a:t>
-            </a:r>
-          </a:p>
-          <a:p>
-            <a:pPr lvl="1"/>
-            <a:endParaRPr lang="en-US" dirty="0"/>
-          </a:p>
-        </p:txBody>
-      </p:sp>
-      <p:sp>
-        <p:nvSpPr>
-          <p:cNvPr id="3" name="Title 2"/>
-          <p:cNvSpPr>
-            <a:spLocks noGrp="1"/>
-          </p:cNvSpPr>
-          <p:nvPr>
-            <p:ph type="title"/>
-          </p:nvPr>
-        </p:nvSpPr>
-        <p:spPr/>
-        <p:txBody>
-          <a:bodyPr/>
-          <a:lstStyle/>
-          <a:p>
-            <a:r>
-              <a:rPr lang="en-US" dirty="0" smtClean="0"/>
-              <a:t>Hibernate</a:t>
-            </a:r>
-            <a:endParaRPr lang="en-US" dirty="0"/>
-          </a:p>
-        </p:txBody>
-      </p:sp>
-    </p:spTree>
-    <p:extLst>
-      <p:ext uri="{BB962C8B-B14F-4D97-AF65-F5344CB8AC3E}">
-        <p14:creationId xmlns:p14="http://schemas.microsoft.com/office/powerpoint/2010/main" val="351397098"/>
       </p:ext>
     </p:extLst>
   </p:cSld>
@@ -5618,57 +5975,7 @@
               <a:rPr lang="en-US" dirty="0" smtClean="0"/>
               <a:t>Spring</a:t>
             </a:r>
-          </a:p>
-          <a:p>
-            <a:pPr marL="880110" lvl="1" indent="-514350">
-              <a:buFont typeface="+mj-lt"/>
-              <a:buAutoNum type="arabicPeriod"/>
-            </a:pPr>
-            <a:r>
-              <a:rPr lang="en-US" dirty="0" smtClean="0"/>
-              <a:t>Spring</a:t>
-            </a:r>
-          </a:p>
-          <a:p>
-            <a:pPr marL="880110" lvl="1" indent="-514350">
-              <a:buFont typeface="+mj-lt"/>
-              <a:buAutoNum type="arabicPeriod"/>
-            </a:pPr>
-            <a:r>
-              <a:rPr lang="en-US" dirty="0" smtClean="0"/>
-              <a:t>Spring Core</a:t>
-            </a:r>
-          </a:p>
-          <a:p>
-            <a:pPr marL="880110" lvl="1" indent="-514350">
-              <a:buFont typeface="+mj-lt"/>
-              <a:buAutoNum type="arabicPeriod"/>
-            </a:pPr>
-            <a:r>
-              <a:rPr lang="en-US" dirty="0" err="1" smtClean="0"/>
-              <a:t>IoC</a:t>
-            </a:r>
             <a:endParaRPr lang="en-US" dirty="0" smtClean="0"/>
-          </a:p>
-          <a:p>
-            <a:pPr marL="880110" lvl="1" indent="-514350">
-              <a:buFont typeface="+mj-lt"/>
-              <a:buAutoNum type="arabicPeriod"/>
-            </a:pPr>
-            <a:r>
-              <a:rPr lang="en-US" dirty="0" smtClean="0"/>
-              <a:t>DI</a:t>
-            </a:r>
-          </a:p>
-          <a:p>
-            <a:pPr marL="880110" lvl="1" indent="-514350">
-              <a:buFont typeface="+mj-lt"/>
-              <a:buAutoNum type="arabicPeriod"/>
-            </a:pPr>
-            <a:r>
-              <a:rPr lang="en-US" dirty="0" smtClean="0"/>
-              <a:t>Spring MVC</a:t>
-            </a:r>
           </a:p>
           <a:p>
             <a:pPr marL="624078" indent="-514350">
@@ -5677,9 +5984,54 @@
             </a:pPr>
             <a:r>
               <a:rPr lang="en-US" dirty="0" smtClean="0"/>
-              <a:t>Hibernate</a:t>
-            </a:r>
-            <a:endParaRPr lang="en-US" dirty="0"/>
+              <a:t>Spring AOP</a:t>
+            </a:r>
+          </a:p>
+          <a:p>
+            <a:pPr marL="624078" indent="-514350">
+              <a:buFont typeface="+mj-lt"/>
+              <a:buAutoNum type="arabicPeriod"/>
+            </a:pPr>
+            <a:r>
+              <a:rPr lang="en-US" dirty="0" smtClean="0"/>
+              <a:t>Spring Core</a:t>
+            </a:r>
+          </a:p>
+          <a:p>
+            <a:pPr marL="624078" indent="-514350">
+              <a:buFont typeface="+mj-lt"/>
+              <a:buAutoNum type="arabicPeriod"/>
+            </a:pPr>
+            <a:r>
+              <a:rPr lang="en-US" dirty="0" err="1" smtClean="0"/>
+              <a:t>IoC</a:t>
+            </a:r>
+            <a:endParaRPr lang="en-US" dirty="0" smtClean="0"/>
+          </a:p>
+          <a:p>
+            <a:pPr marL="624078" indent="-514350">
+              <a:buFont typeface="+mj-lt"/>
+              <a:buAutoNum type="arabicPeriod"/>
+            </a:pPr>
+            <a:r>
+              <a:rPr lang="en-US" dirty="0" smtClean="0"/>
+              <a:t>DI</a:t>
+            </a:r>
+          </a:p>
+          <a:p>
+            <a:pPr marL="624078" indent="-514350">
+              <a:buFont typeface="+mj-lt"/>
+              <a:buAutoNum type="arabicPeriod"/>
+            </a:pPr>
+            <a:r>
+              <a:rPr lang="en-US" dirty="0" smtClean="0"/>
+              <a:t>Spring </a:t>
+            </a:r>
+            <a:r>
+              <a:rPr lang="en-US" dirty="0" smtClean="0"/>
+              <a:t>MVC</a:t>
+            </a:r>
+            <a:endParaRPr lang="en-US" dirty="0" smtClean="0"/>
           </a:p>
         </p:txBody>
       </p:sp>
@@ -5745,12 +6097,12 @@
       </p:grpSpPr>
       <p:sp>
         <p:nvSpPr>
-          <p:cNvPr id="4" name="Title 3"/>
-          <p:cNvSpPr>
-            <a:spLocks noGrp="1"/>
-          </p:cNvSpPr>
-          <p:nvPr>
-            <p:ph type="title"/>
+          <p:cNvPr id="2" name="Content Placeholder 1"/>
+          <p:cNvSpPr>
+            <a:spLocks noGrp="1"/>
+          </p:cNvSpPr>
+          <p:nvPr>
+            <p:ph idx="1"/>
           </p:nvPr>
         </p:nvSpPr>
         <p:spPr/>
@@ -5759,21 +6111,38 @@
           <a:lstStyle/>
           <a:p>
             <a:r>
-              <a:rPr lang="en-US" dirty="0" smtClean="0"/>
-              <a:t>Spring</a:t>
-            </a:r>
-            <a:endParaRPr lang="en-US" dirty="0"/>
-          </a:p>
-        </p:txBody>
-      </p:sp>
-      <p:sp>
-        <p:nvSpPr>
-          <p:cNvPr id="5" name="Text Placeholder 4"/>
-          <p:cNvSpPr>
-            <a:spLocks noGrp="1"/>
-          </p:cNvSpPr>
-          <p:nvPr>
-            <p:ph type="body" idx="1"/>
+              <a:rPr lang="en-US" b="1" dirty="0" smtClean="0"/>
+              <a:t>Spring framework (Spring) </a:t>
+            </a:r>
+            <a:r>
+              <a:rPr lang="en-US" dirty="0" smtClean="0"/>
+              <a:t>is a lightweight framework that provides </a:t>
+            </a:r>
+            <a:r>
+              <a:rPr lang="en-US" dirty="0"/>
+              <a:t>infrastructural </a:t>
+            </a:r>
+            <a:r>
+              <a:rPr lang="en-US" dirty="0" smtClean="0"/>
+              <a:t>support for any applications including Java EE applications.</a:t>
+            </a:r>
+          </a:p>
+          <a:p>
+            <a:r>
+              <a:rPr lang="en-US" dirty="0" smtClean="0"/>
+              <a:t>Spring is used for handling application’s infrastructure.</a:t>
+            </a:r>
+          </a:p>
+        </p:txBody>
+      </p:sp>
+      <p:sp>
+        <p:nvSpPr>
+          <p:cNvPr id="3" name="Title 2"/>
+          <p:cNvSpPr>
+            <a:spLocks noGrp="1"/>
+          </p:cNvSpPr>
+          <p:nvPr>
+            <p:ph type="title"/>
           </p:nvPr>
         </p:nvSpPr>
         <p:spPr/>
@@ -5781,6 +6150,10 @@
           <a:bodyPr/>
           <a:lstStyle/>
           <a:p>
+            <a:r>
+              <a:rPr lang="en-US" dirty="0" smtClean="0"/>
+              <a:t>Spring</a:t>
+            </a:r>
             <a:endParaRPr lang="en-US" dirty="0"/>
           </a:p>
         </p:txBody>
@@ -5788,7 +6161,7 @@
     </p:spTree>
     <p:extLst>
       <p:ext uri="{BB962C8B-B14F-4D97-AF65-F5344CB8AC3E}">
-        <p14:creationId xmlns:p14="http://schemas.microsoft.com/office/powerpoint/2010/main" val="1452408420"/>
+        <p14:creationId xmlns:p14="http://schemas.microsoft.com/office/powerpoint/2010/main" val="4247118179"/>
       </p:ext>
     </p:extLst>
   </p:cSld>
@@ -5838,121 +6211,8 @@
           <a:lstStyle/>
           <a:p>
             <a:r>
-              <a:rPr lang="en-US" b="1" dirty="0" smtClean="0"/>
-              <a:t>Spring framework (Spring) </a:t>
-            </a:r>
-            <a:r>
-              <a:rPr lang="en-US" dirty="0" smtClean="0"/>
-              <a:t>is a lightweight framework that provides </a:t>
-            </a:r>
-            <a:r>
-              <a:rPr lang="en-US" dirty="0"/>
-              <a:t>infrastructural </a:t>
-            </a:r>
-            <a:r>
-              <a:rPr lang="en-US" dirty="0" smtClean="0"/>
-              <a:t>support for any applications including Java EE applications.</a:t>
-            </a:r>
-          </a:p>
-          <a:p>
-            <a:r>
-              <a:rPr lang="en-US" dirty="0" smtClean="0"/>
-              <a:t>Spring is </a:t>
-            </a:r>
-            <a:r>
-              <a:rPr lang="en-US" dirty="0" smtClean="0"/>
-              <a:t>used for </a:t>
-            </a:r>
-            <a:r>
-              <a:rPr lang="en-US" dirty="0" smtClean="0"/>
-              <a:t>handling application’s </a:t>
-            </a:r>
-            <a:r>
-              <a:rPr lang="en-US" dirty="0" smtClean="0"/>
-              <a:t>infrastructure.</a:t>
-            </a:r>
-            <a:endParaRPr lang="en-US" dirty="0" smtClean="0"/>
-          </a:p>
-        </p:txBody>
-      </p:sp>
-      <p:sp>
-        <p:nvSpPr>
-          <p:cNvPr id="3" name="Title 2"/>
-          <p:cNvSpPr>
-            <a:spLocks noGrp="1"/>
-          </p:cNvSpPr>
-          <p:nvPr>
-            <p:ph type="title"/>
-          </p:nvPr>
-        </p:nvSpPr>
-        <p:spPr/>
-        <p:txBody>
-          <a:bodyPr/>
-          <a:lstStyle/>
-          <a:p>
-            <a:r>
-              <a:rPr lang="en-US" dirty="0" smtClean="0"/>
-              <a:t>Spring</a:t>
-            </a:r>
-            <a:endParaRPr lang="en-US" dirty="0"/>
-          </a:p>
-        </p:txBody>
-      </p:sp>
-    </p:spTree>
-    <p:extLst>
-      <p:ext uri="{BB962C8B-B14F-4D97-AF65-F5344CB8AC3E}">
-        <p14:creationId xmlns:p14="http://schemas.microsoft.com/office/powerpoint/2010/main" val="4247118179"/>
-      </p:ext>
-    </p:extLst>
-  </p:cSld>
-  <p:clrMapOvr>
-    <a:masterClrMapping/>
-  </p:clrMapOvr>
-  <p:timing>
-    <p:tnLst>
-      <p:par>
-        <p:cTn id="1" dur="indefinite" restart="never" nodeType="tmRoot"/>
-      </p:par>
-    </p:tnLst>
-  </p:timing>
-</p:sld>
-</file>
-
-<file path=ppt/slides/slide5.xml><?xml version="1.0" encoding="utf-8"?>
-<p:sld xmlns:a="http://schemas.openxmlformats.org/drawingml/2006/main" xmlns:r="http://schemas.openxmlformats.org/officeDocument/2006/relationships" xmlns:p="http://schemas.openxmlformats.org/presentationml/2006/main">
-  <p:cSld>
-    <p:spTree>
-      <p:nvGrpSpPr>
-        <p:cNvPr id="1" name=""/>
-        <p:cNvGrpSpPr/>
-        <p:nvPr/>
-      </p:nvGrpSpPr>
-      <p:grpSpPr>
-        <a:xfrm>
-          <a:off x="0" y="0"/>
-          <a:ext cx="0" cy="0"/>
-          <a:chOff x="0" y="0"/>
-          <a:chExt cx="0" cy="0"/>
-        </a:xfrm>
-      </p:grpSpPr>
-      <p:sp>
-        <p:nvSpPr>
-          <p:cNvPr id="2" name="Content Placeholder 1"/>
-          <p:cNvSpPr>
-            <a:spLocks noGrp="1"/>
-          </p:cNvSpPr>
-          <p:nvPr>
-            <p:ph idx="1"/>
-          </p:nvPr>
-        </p:nvSpPr>
-        <p:spPr/>
-        <p:txBody>
-          <a:bodyPr/>
-          <a:lstStyle/>
-          <a:p>
-            <a:r>
-              <a:rPr lang="en-US" dirty="0" smtClean="0"/>
-              <a:t>Architecture:</a:t>
+              <a:rPr lang="en-US" dirty="0" smtClean="0"/>
+              <a:t>Spring’s architecture:</a:t>
             </a:r>
             <a:endParaRPr lang="en-US" dirty="0"/>
           </a:p>
@@ -6042,6 +6302,207 @@
 </p:sld>
 </file>
 
+<file path=ppt/slides/slide5.xml><?xml version="1.0" encoding="utf-8"?>
+<p:sld xmlns:a="http://schemas.openxmlformats.org/drawingml/2006/main" xmlns:r="http://schemas.openxmlformats.org/officeDocument/2006/relationships" xmlns:p="http://schemas.openxmlformats.org/presentationml/2006/main">
+  <p:cSld>
+    <p:spTree>
+      <p:nvGrpSpPr>
+        <p:cNvPr id="1" name=""/>
+        <p:cNvGrpSpPr/>
+        <p:nvPr/>
+      </p:nvGrpSpPr>
+      <p:grpSpPr>
+        <a:xfrm>
+          <a:off x="0" y="0"/>
+          <a:ext cx="0" cy="0"/>
+          <a:chOff x="0" y="0"/>
+          <a:chExt cx="0" cy="0"/>
+        </a:xfrm>
+      </p:grpSpPr>
+      <p:pic>
+        <p:nvPicPr>
+          <p:cNvPr id="4098" name="Picture 2" descr="C:\Users\HuanPM\Desktop\AOP terms.jpg"/>
+          <p:cNvPicPr>
+            <a:picLocks noChangeAspect="1" noChangeArrowheads="1"/>
+          </p:cNvPicPr>
+          <p:nvPr/>
+        </p:nvPicPr>
+        <p:blipFill>
+          <a:blip r:embed="rId2">
+            <a:extLst>
+              <a:ext uri="{28A0092B-C50C-407E-A947-70E740481C1C}">
+                <a14:useLocalDpi xmlns:a14="http://schemas.microsoft.com/office/drawing/2010/main" val="0"/>
+              </a:ext>
+            </a:extLst>
+          </a:blip>
+          <a:srcRect/>
+          <a:stretch>
+            <a:fillRect/>
+          </a:stretch>
+        </p:blipFill>
+        <p:spPr bwMode="auto">
+          <a:xfrm>
+            <a:off x="3651250" y="3733800"/>
+            <a:ext cx="5035550" cy="2971800"/>
+          </a:xfrm>
+          <a:prstGeom prst="rect">
+            <a:avLst/>
+          </a:prstGeom>
+          <a:noFill/>
+          <a:extLst>
+            <a:ext uri="{909E8E84-426E-40DD-AFC4-6F175D3DCCD1}">
+              <a14:hiddenFill xmlns:a14="http://schemas.microsoft.com/office/drawing/2010/main">
+                <a:solidFill>
+                  <a:srgbClr val="FFFFFF"/>
+                </a:solidFill>
+              </a14:hiddenFill>
+            </a:ext>
+          </a:extLst>
+        </p:spPr>
+      </p:pic>
+      <p:sp>
+        <p:nvSpPr>
+          <p:cNvPr id="2" name="Content Placeholder 1"/>
+          <p:cNvSpPr>
+            <a:spLocks noGrp="1"/>
+          </p:cNvSpPr>
+          <p:nvPr>
+            <p:ph idx="1"/>
+          </p:nvPr>
+        </p:nvSpPr>
+        <p:spPr/>
+        <p:txBody>
+          <a:bodyPr/>
+          <a:lstStyle/>
+          <a:p>
+            <a:r>
+              <a:rPr lang="en-US" dirty="0" smtClean="0"/>
+              <a:t>AOP (</a:t>
+            </a:r>
+            <a:r>
+              <a:rPr lang="en-US" b="1" dirty="0"/>
+              <a:t>Aspect-oriented </a:t>
+            </a:r>
+            <a:r>
+              <a:rPr lang="en-US" b="1" dirty="0" smtClean="0"/>
+              <a:t>programming)</a:t>
+            </a:r>
+            <a:r>
+              <a:rPr lang="en-US" dirty="0" smtClean="0"/>
+              <a:t>: </a:t>
+            </a:r>
+            <a:r>
+              <a:rPr lang="en-US" dirty="0"/>
+              <a:t>a programming </a:t>
+            </a:r>
+            <a:r>
+              <a:rPr lang="en-US" dirty="0" smtClean="0"/>
+              <a:t>paradigm that entails </a:t>
+            </a:r>
+            <a:r>
+              <a:rPr lang="en-US" dirty="0"/>
+              <a:t>breaking down program logic into distinct </a:t>
+            </a:r>
+            <a:r>
+              <a:rPr lang="en-US" dirty="0" smtClean="0"/>
+              <a:t>parts (called </a:t>
+            </a:r>
+            <a:r>
+              <a:rPr lang="en-US" dirty="0"/>
+              <a:t>concerns)</a:t>
+            </a:r>
+            <a:r>
+              <a:rPr lang="en-US" dirty="0" smtClean="0"/>
+              <a:t>.</a:t>
+            </a:r>
+          </a:p>
+          <a:p>
+            <a:r>
+              <a:rPr lang="en-US" dirty="0"/>
+              <a:t>Spring AOP module provides interceptors to intercept an </a:t>
+            </a:r>
+            <a:r>
+              <a:rPr lang="en-US" dirty="0" smtClean="0"/>
+              <a:t>application by:</a:t>
+            </a:r>
+          </a:p>
+          <a:p>
+            <a:pPr lvl="1"/>
+            <a:r>
+              <a:rPr lang="en-US" dirty="0" smtClean="0"/>
+              <a:t>Spring old style (</a:t>
+            </a:r>
+            <a:r>
+              <a:rPr lang="en-US" dirty="0" err="1" smtClean="0"/>
+              <a:t>dtd</a:t>
+            </a:r>
+            <a:r>
+              <a:rPr lang="en-US" dirty="0" smtClean="0"/>
+              <a:t> based).</a:t>
+            </a:r>
+          </a:p>
+          <a:p>
+            <a:pPr lvl="1"/>
+            <a:r>
+              <a:rPr lang="en-US" dirty="0" err="1" smtClean="0"/>
+              <a:t>AspectJ</a:t>
+            </a:r>
+            <a:endParaRPr lang="en-US" dirty="0" smtClean="0"/>
+          </a:p>
+          <a:p>
+            <a:pPr lvl="1"/>
+            <a:r>
+              <a:rPr lang="en-US" dirty="0" smtClean="0"/>
+              <a:t>Spring XML </a:t>
+            </a:r>
+            <a:r>
+              <a:rPr lang="en-US" dirty="0" smtClean="0"/>
+              <a:t>configuration</a:t>
+            </a:r>
+            <a:endParaRPr lang="en-US" dirty="0" smtClean="0"/>
+          </a:p>
+        </p:txBody>
+      </p:sp>
+      <p:sp>
+        <p:nvSpPr>
+          <p:cNvPr id="3" name="Title 2"/>
+          <p:cNvSpPr>
+            <a:spLocks noGrp="1"/>
+          </p:cNvSpPr>
+          <p:nvPr>
+            <p:ph type="title"/>
+          </p:nvPr>
+        </p:nvSpPr>
+        <p:spPr/>
+        <p:txBody>
+          <a:bodyPr/>
+          <a:lstStyle/>
+          <a:p>
+            <a:r>
+              <a:rPr lang="en-US" dirty="0" smtClean="0"/>
+              <a:t>Spring </a:t>
+            </a:r>
+            <a:r>
+              <a:rPr lang="en-US" dirty="0" smtClean="0"/>
+              <a:t>AOP</a:t>
+            </a:r>
+            <a:endParaRPr lang="en-US" dirty="0"/>
+          </a:p>
+        </p:txBody>
+      </p:sp>
+    </p:spTree>
+    <p:extLst>
+      <p:ext uri="{BB962C8B-B14F-4D97-AF65-F5344CB8AC3E}">
+        <p14:creationId xmlns:p14="http://schemas.microsoft.com/office/powerpoint/2010/main" val="403177181"/>
+      </p:ext>
+    </p:extLst>
+  </p:cSld>
+  <p:clrMapOvr>
+    <a:masterClrMapping/>
+  </p:clrMapOvr>
+</p:sld>
+</file>
+
 <file path=ppt/slides/slide6.xml><?xml version="1.0" encoding="utf-8"?>
 <p:sld xmlns:a="http://schemas.openxmlformats.org/drawingml/2006/main" xmlns:r="http://schemas.openxmlformats.org/officeDocument/2006/relationships" xmlns:p="http://schemas.openxmlformats.org/presentationml/2006/main">
   <p:cSld>
@@ -6078,31 +6539,14 @@
           <a:p>
             <a:r>
               <a:rPr lang="en-US" dirty="0" smtClean="0"/>
-              <a:t>Spring Core is </a:t>
-            </a:r>
-            <a:r>
-              <a:rPr lang="en-US" dirty="0" smtClean="0"/>
-              <a:t>a </a:t>
-            </a:r>
-            <a:r>
-              <a:rPr lang="en-US" dirty="0" smtClean="0"/>
-              <a:t>container </a:t>
-            </a:r>
-            <a:r>
-              <a:rPr lang="en-US" dirty="0" smtClean="0"/>
-              <a:t>providing</a:t>
-            </a:r>
-            <a:r>
-              <a:rPr lang="en-US" dirty="0" smtClean="0"/>
-              <a:t> </a:t>
-            </a:r>
-            <a:r>
-              <a:rPr lang="en-US" dirty="0"/>
-              <a:t>Inversion of Control </a:t>
-            </a:r>
-            <a:r>
-              <a:rPr lang="en-US" dirty="0" smtClean="0"/>
-              <a:t>(</a:t>
+              <a:t>Spring Core components:</a:t>
+            </a:r>
+          </a:p>
+          <a:p>
+            <a:pPr lvl="1"/>
+            <a:r>
+              <a:rPr lang="en-US" dirty="0" smtClean="0"/>
+              <a:t>Spring </a:t>
             </a:r>
             <a:r>
               <a:rPr lang="en-US" dirty="0" err="1" smtClean="0"/>
@@ -6110,99 +6554,39 @@
             </a:r>
             <a:r>
               <a:rPr lang="en-US" dirty="0" smtClean="0"/>
-              <a:t>) </a:t>
+              <a:t> container: </a:t>
+            </a:r>
+          </a:p>
+          <a:p>
+            <a:pPr lvl="1"/>
+            <a:r>
+              <a:rPr lang="en-US" dirty="0" smtClean="0"/>
+              <a:t>Spring Bean:</a:t>
             </a:r>
             <a:r>
               <a:rPr lang="en-US" dirty="0"/>
-              <a:t>and Dependency </a:t>
-            </a:r>
-            <a:r>
-              <a:rPr lang="en-US" dirty="0" smtClean="0"/>
-              <a:t>Injection (DI).</a:t>
-            </a:r>
-            <a:endParaRPr lang="en-US" dirty="0" smtClean="0"/>
-          </a:p>
-          <a:p>
+              <a:t> an object that is instantiated, assembled, and </a:t>
+            </a:r>
+            <a:r>
+              <a:rPr lang="en-US" dirty="0" smtClean="0"/>
+              <a:t>managed </a:t>
+            </a:r>
             <a:r>
               <a:rPr lang="en-US" dirty="0"/>
-              <a:t>The container </a:t>
-            </a:r>
-            <a:r>
-              <a:rPr lang="en-US" dirty="0" smtClean="0"/>
-              <a:t>will:</a:t>
-            </a:r>
-          </a:p>
-          <a:p>
-            <a:pPr lvl="1"/>
+              <a:t>by a Spring </a:t>
+            </a:r>
+            <a:r>
+              <a:rPr lang="en-US" dirty="0" err="1"/>
+              <a:t>IoC</a:t>
+            </a:r>
             <a:r>
               <a:rPr lang="en-US" dirty="0"/>
-              <a:t>C</a:t>
-            </a:r>
-            <a:r>
-              <a:rPr lang="en-US" dirty="0" smtClean="0"/>
-              <a:t>reate </a:t>
-            </a:r>
-            <a:r>
-              <a:rPr lang="en-US" dirty="0"/>
-              <a:t>the </a:t>
-            </a:r>
-            <a:r>
-              <a:rPr lang="en-US" dirty="0" smtClean="0"/>
-              <a:t>objects</a:t>
-            </a:r>
-            <a:r>
-              <a:rPr lang="en-US" dirty="0"/>
-              <a:t>.</a:t>
-            </a:r>
-            <a:endParaRPr lang="en-US" dirty="0" smtClean="0"/>
-          </a:p>
-          <a:p>
-            <a:pPr lvl="1"/>
-            <a:r>
-              <a:rPr lang="en-US" dirty="0" smtClean="0"/>
-              <a:t>Wire </a:t>
-            </a:r>
-            <a:r>
-              <a:rPr lang="en-US" dirty="0"/>
-              <a:t>them </a:t>
-            </a:r>
-            <a:r>
-              <a:rPr lang="en-US" dirty="0" smtClean="0"/>
-              <a:t>together</a:t>
-            </a:r>
-            <a:r>
-              <a:rPr lang="en-US" dirty="0"/>
-              <a:t>.</a:t>
-            </a:r>
-            <a:endParaRPr lang="en-US" dirty="0" smtClean="0"/>
-          </a:p>
-          <a:p>
-            <a:pPr lvl="1"/>
-            <a:r>
-              <a:rPr lang="en-US" dirty="0" smtClean="0"/>
-              <a:t>Configure them</a:t>
-            </a:r>
-            <a:r>
-              <a:rPr lang="en-US" dirty="0"/>
-              <a:t>.</a:t>
-            </a:r>
-            <a:endParaRPr lang="en-US" dirty="0" smtClean="0"/>
-          </a:p>
-          <a:p>
-            <a:pPr lvl="1"/>
-            <a:r>
-              <a:rPr lang="en-US" dirty="0" smtClean="0"/>
-              <a:t>Manage </a:t>
-            </a:r>
-            <a:r>
-              <a:rPr lang="en-US" dirty="0"/>
-              <a:t>their complete </a:t>
-            </a:r>
-            <a:r>
-              <a:rPr lang="en-US" dirty="0" smtClean="0"/>
-              <a:t>lifecycle.</a:t>
-            </a:r>
-            <a:endParaRPr lang="en-US" dirty="0"/>
+              <a:t> </a:t>
+            </a:r>
+            <a:r>
+              <a:rPr lang="en-US" dirty="0" smtClean="0"/>
+              <a:t>container</a:t>
+            </a:r>
           </a:p>
         </p:txBody>
       </p:sp>
@@ -6266,6 +6650,47 @@
           <a:chExt cx="0" cy="0"/>
         </a:xfrm>
       </p:grpSpPr>
+      <p:pic>
+        <p:nvPicPr>
+          <p:cNvPr id="1026" name="Picture 2" descr="C:\Users\HuanPM\Desktop\container-magic.png"/>
+          <p:cNvPicPr>
+            <a:picLocks noChangeAspect="1" noChangeArrowheads="1"/>
+          </p:cNvPicPr>
+          <p:nvPr/>
+        </p:nvPicPr>
+        <p:blipFill>
+          <a:blip r:embed="rId2">
+            <a:extLst>
+              <a:ext uri="{28A0092B-C50C-407E-A947-70E740481C1C}">
+                <a14:useLocalDpi xmlns:a14="http://schemas.microsoft.com/office/drawing/2010/main" val="0"/>
+              </a:ext>
+            </a:extLst>
+          </a:blip>
+          <a:srcRect/>
+          <a:stretch>
+            <a:fillRect/>
+          </a:stretch>
+        </p:blipFill>
+        <p:spPr bwMode="auto">
+          <a:xfrm>
+            <a:off x="4343400" y="1219200"/>
+            <a:ext cx="4743450" cy="2819400"/>
+          </a:xfrm>
+          <a:prstGeom prst="rect">
+            <a:avLst/>
+          </a:prstGeom>
+          <a:noFill/>
+          <a:extLst>
+            <a:ext uri="{909E8E84-426E-40DD-AFC4-6F175D3DCCD1}">
+              <a14:hiddenFill xmlns:a14="http://schemas.microsoft.com/office/drawing/2010/main">
+                <a:solidFill>
+                  <a:srgbClr val="FFFFFF"/>
+                </a:solidFill>
+              </a14:hiddenFill>
+            </a:ext>
+          </a:extLst>
+        </p:spPr>
+      </p:pic>
       <p:sp>
         <p:nvSpPr>
           <p:cNvPr id="2" name="Content Placeholder 1"/>
@@ -6282,88 +6707,109 @@
           <a:lstStyle/>
           <a:p>
             <a:r>
-              <a:rPr lang="en-US" b="1" dirty="0"/>
-              <a:t>Inversion of Control (</a:t>
-            </a:r>
-            <a:r>
-              <a:rPr lang="en-US" b="1" dirty="0" err="1"/>
-              <a:t>IoC</a:t>
-            </a:r>
-            <a:r>
-              <a:rPr lang="en-US" b="1" dirty="0"/>
-              <a:t>) </a:t>
+              <a:rPr lang="en-US" dirty="0" smtClean="0"/>
+              <a:t>The core of Spring framework.</a:t>
+            </a:r>
+          </a:p>
+          <a:p>
+            <a:r>
+              <a:rPr lang="en-US" dirty="0" smtClean="0"/>
+              <a:t>The </a:t>
             </a:r>
             <a:r>
               <a:rPr lang="en-US" dirty="0"/>
-              <a:t>is a design principle describes designs in which </a:t>
-            </a:r>
-            <a:r>
-              <a:rPr lang="en-US" dirty="0" smtClean="0"/>
-              <a:t>inverts control </a:t>
-            </a:r>
+              <a:t>container will:</a:t>
+            </a:r>
+          </a:p>
+          <a:p>
+            <a:pPr lvl="1"/>
             <a:r>
               <a:rPr lang="en-US" dirty="0"/>
-              <a:t>flow as compared to traditional </a:t>
-            </a:r>
-            <a:r>
-              <a:rPr lang="en-US" dirty="0" smtClean="0"/>
-              <a:t>procedural programming.</a:t>
+              <a:t>Create the objects.</a:t>
             </a:r>
           </a:p>
           <a:p>
             <a:pPr lvl="1"/>
             <a:r>
-              <a:rPr lang="en-US" dirty="0" smtClean="0"/>
-              <a:t>Traditional: application code =&gt; framework code.</a:t>
+              <a:rPr lang="en-US" dirty="0"/>
+              <a:t>Wire them together.</a:t>
             </a:r>
           </a:p>
           <a:p>
             <a:pPr lvl="1"/>
+            <a:r>
+              <a:rPr lang="en-US" dirty="0"/>
+              <a:t>Configure them.</a:t>
+            </a:r>
+          </a:p>
+          <a:p>
+            <a:pPr lvl="1"/>
+            <a:r>
+              <a:rPr lang="en-US" dirty="0"/>
+              <a:t>Manage their complete lifecycle.</a:t>
+            </a:r>
+          </a:p>
+          <a:p>
+            <a:r>
+              <a:rPr lang="en-US" dirty="0" smtClean="0"/>
+              <a:t>Spring provide 2 types of container:</a:t>
+            </a:r>
+          </a:p>
+          <a:p>
+            <a:pPr lvl="1"/>
+            <a:r>
+              <a:rPr lang="en-US" dirty="0" err="1"/>
+              <a:t>BeanFactory</a:t>
+            </a:r>
+            <a:r>
+              <a:rPr lang="en-US" dirty="0"/>
+              <a:t> container</a:t>
+            </a:r>
+          </a:p>
+          <a:p>
+            <a:pPr lvl="1"/>
+            <a:r>
+              <a:rPr lang="en-US" dirty="0" err="1"/>
+              <a:t>ApplicationContext</a:t>
+            </a:r>
+            <a:r>
+              <a:rPr lang="en-US" dirty="0"/>
+              <a:t> </a:t>
+            </a:r>
+            <a:r>
+              <a:rPr lang="en-US" dirty="0" smtClean="0"/>
+              <a:t>container</a:t>
+            </a:r>
+            <a:endParaRPr lang="en-US" dirty="0"/>
+          </a:p>
+        </p:txBody>
+      </p:sp>
+      <p:sp>
+        <p:nvSpPr>
+          <p:cNvPr id="3" name="Title 2"/>
+          <p:cNvSpPr>
+            <a:spLocks noGrp="1"/>
+          </p:cNvSpPr>
+          <p:nvPr>
+            <p:ph type="title"/>
+          </p:nvPr>
+        </p:nvSpPr>
+        <p:spPr/>
+        <p:txBody>
+          <a:bodyPr/>
+          <a:lstStyle/>
+          <a:p>
+            <a:r>
+              <a:rPr lang="en-US" dirty="0" smtClean="0"/>
+              <a:t>Spring </a:t>
+            </a:r>
             <a:r>
               <a:rPr lang="en-US" dirty="0" err="1" smtClean="0"/>
               <a:t>IoC</a:t>
             </a:r>
             <a:r>
               <a:rPr lang="en-US" dirty="0" smtClean="0"/>
-              <a:t>: framework code =&gt; application code.</a:t>
-            </a:r>
-            <a:endParaRPr lang="en-US" dirty="0"/>
-          </a:p>
-          <a:p>
-            <a:r>
-              <a:rPr lang="en-US" dirty="0" smtClean="0"/>
-              <a:t>IOC is used </a:t>
-            </a:r>
-            <a:r>
-              <a:rPr lang="en-US" dirty="0"/>
-              <a:t>to increase modularity of the program and make it </a:t>
-            </a:r>
-            <a:r>
-              <a:rPr lang="en-US" dirty="0" smtClean="0"/>
-              <a:t>extensible.</a:t>
-            </a:r>
-            <a:endParaRPr lang="en-US" dirty="0"/>
-          </a:p>
-        </p:txBody>
-      </p:sp>
-      <p:sp>
-        <p:nvSpPr>
-          <p:cNvPr id="3" name="Title 2"/>
-          <p:cNvSpPr>
-            <a:spLocks noGrp="1"/>
-          </p:cNvSpPr>
-          <p:nvPr>
-            <p:ph type="title"/>
-          </p:nvPr>
-        </p:nvSpPr>
-        <p:spPr/>
-        <p:txBody>
-          <a:bodyPr/>
-          <a:lstStyle/>
-          <a:p>
-            <a:r>
-              <a:rPr lang="en-US" dirty="0" smtClean="0"/>
-              <a:t>Inversion of Control</a:t>
+              <a:t> Container</a:t>
             </a:r>
             <a:endParaRPr lang="en-US" dirty="0"/>
           </a:p>
@@ -6372,20 +6818,13 @@
     </p:spTree>
     <p:extLst>
       <p:ext uri="{BB962C8B-B14F-4D97-AF65-F5344CB8AC3E}">
-        <p14:creationId xmlns:p14="http://schemas.microsoft.com/office/powerpoint/2010/main" val="2666727699"/>
+        <p14:creationId xmlns:p14="http://schemas.microsoft.com/office/powerpoint/2010/main" val="983649192"/>
       </p:ext>
     </p:extLst>
   </p:cSld>
   <p:clrMapOvr>
     <a:masterClrMapping/>
   </p:clrMapOvr>
-  <p:timing>
-    <p:tnLst>
-      <p:par>
-        <p:cTn id="1" dur="indefinite" restart="never" nodeType="tmRoot"/>
-      </p:par>
-    </p:tnLst>
-  </p:timing>
 </p:sld>
 </file>
 
@@ -6422,67 +6861,66 @@
           <a:lstStyle/>
           <a:p>
             <a:r>
-              <a:rPr lang="en-US" b="1" dirty="0" smtClean="0"/>
-              <a:t>Dependency Injection (DI) </a:t>
-            </a:r>
-            <a:r>
-              <a:rPr lang="en-US" dirty="0" smtClean="0"/>
-              <a:t>is a way to implement </a:t>
-            </a:r>
+              <a:rPr lang="en-US" b="1" dirty="0"/>
+              <a:t>Inversion of Control (</a:t>
+            </a:r>
+            <a:r>
+              <a:rPr lang="en-US" b="1" dirty="0" err="1"/>
+              <a:t>IoC</a:t>
+            </a:r>
+            <a:r>
+              <a:rPr lang="en-US" b="1" dirty="0"/>
+              <a:t>) </a:t>
+            </a:r>
+            <a:r>
+              <a:rPr lang="en-US" dirty="0"/>
+              <a:t>is a design principle describes designs in which </a:t>
+            </a:r>
+            <a:r>
+              <a:rPr lang="en-US" dirty="0" smtClean="0"/>
+              <a:t>inverts control </a:t>
+            </a:r>
+            <a:r>
+              <a:rPr lang="en-US" dirty="0"/>
+              <a:t>flow as compared to traditional </a:t>
+            </a:r>
+            <a:r>
+              <a:rPr lang="en-US" dirty="0" smtClean="0"/>
+              <a:t>procedural programming.</a:t>
+            </a:r>
+          </a:p>
+          <a:p>
+            <a:pPr lvl="1"/>
+            <a:r>
+              <a:rPr lang="en-US" dirty="0" smtClean="0"/>
+              <a:t>Traditional: application code =&gt; framework code.</a:t>
+            </a:r>
+          </a:p>
+          <a:p>
+            <a:pPr lvl="1"/>
             <a:r>
               <a:rPr lang="en-US" dirty="0" err="1" smtClean="0"/>
               <a:t>IoC</a:t>
             </a:r>
             <a:r>
               <a:rPr lang="en-US" dirty="0" smtClean="0"/>
-              <a:t>.</a:t>
-            </a:r>
-          </a:p>
-          <a:p>
-            <a:r>
-              <a:rPr lang="en-US" dirty="0" smtClean="0"/>
-              <a:t>In </a:t>
-            </a:r>
-            <a:r>
-              <a:rPr lang="en-US" dirty="0" smtClean="0"/>
-              <a:t>DI:</a:t>
-            </a:r>
-          </a:p>
-          <a:p>
-            <a:pPr lvl="1"/>
-            <a:r>
-              <a:rPr lang="en-US" dirty="0" smtClean="0"/>
-              <a:t>Low-level </a:t>
+              <a:t>: framework code =&gt; application code.</a:t>
+            </a:r>
+            <a:endParaRPr lang="en-US" dirty="0"/>
+          </a:p>
+          <a:p>
+            <a:r>
+              <a:rPr lang="en-US" dirty="0" smtClean="0"/>
+              <a:t>IOC is used </a:t>
             </a:r>
             <a:r>
               <a:rPr lang="en-US" dirty="0"/>
-              <a:t>modules (class) will be injected to high-level modules (</a:t>
-            </a:r>
-            <a:r>
-              <a:rPr lang="en-US" dirty="0" smtClean="0"/>
-              <a:t>interface).</a:t>
-            </a:r>
-          </a:p>
-          <a:p>
-            <a:pPr lvl="1"/>
-            <a:r>
-              <a:rPr lang="en-US" dirty="0" smtClean="0"/>
-              <a:t>Modules communicate via interfaces</a:t>
-            </a:r>
-            <a:r>
-              <a:rPr lang="en-US" dirty="0" smtClean="0"/>
-              <a:t>.</a:t>
-            </a:r>
-          </a:p>
-          <a:p>
-            <a:pPr lvl="1"/>
-            <a:r>
-              <a:rPr lang="en-US" dirty="0" smtClean="0"/>
-              <a:t>Objects are given their dependencies rather than construct them.</a:t>
-            </a:r>
-            <a:endParaRPr lang="en-US" dirty="0" smtClean="0"/>
-          </a:p>
-          <a:p>
+              <a:t>to increase modularity of the program and make it </a:t>
+            </a:r>
+            <a:r>
+              <a:rPr lang="en-US" dirty="0" smtClean="0"/>
+              <a:t>extensible.</a:t>
+            </a:r>
             <a:endParaRPr lang="en-US" dirty="0"/>
           </a:p>
         </p:txBody>
@@ -6504,7 +6942,7 @@
           <a:p>
             <a:r>
               <a:rPr lang="en-US" dirty="0" smtClean="0"/>
-              <a:t>Dependency Injection</a:t>
+              <a:t>Inversion of Control</a:t>
             </a:r>
             <a:endParaRPr lang="en-US" dirty="0"/>
           </a:p>
@@ -6513,7 +6951,7 @@
     </p:spTree>
     <p:extLst>
       <p:ext uri="{BB962C8B-B14F-4D97-AF65-F5344CB8AC3E}">
-        <p14:creationId xmlns:p14="http://schemas.microsoft.com/office/powerpoint/2010/main" val="3482522386"/>
+        <p14:creationId xmlns:p14="http://schemas.microsoft.com/office/powerpoint/2010/main" val="2666727699"/>
       </p:ext>
     </p:extLst>
   </p:cSld>
@@ -6564,47 +7002,54 @@
           <a:p>
             <a:r>
               <a:rPr lang="en-US" b="1" dirty="0" smtClean="0"/>
-              <a:t>Spring MVC</a:t>
-            </a:r>
-            <a:r>
-              <a:rPr lang="en-US" dirty="0" smtClean="0"/>
-              <a:t>: a MVC framework designed </a:t>
+              <a:t>Dependency Injection (DI): </a:t>
             </a:r>
             <a:r>
               <a:rPr lang="en-US" dirty="0"/>
-              <a:t>around a </a:t>
-            </a:r>
-            <a:r>
-              <a:rPr lang="en-US" dirty="0" smtClean="0"/>
-              <a:t>front </a:t>
-            </a:r>
+              <a:t> a software design pattern that </a:t>
+            </a:r>
+            <a:r>
+              <a:rPr lang="en-US" dirty="0" smtClean="0"/>
+              <a:t>resolves dependencies from a program.</a:t>
+            </a:r>
+          </a:p>
+          <a:p>
+            <a:r>
+              <a:rPr lang="en-US" dirty="0" smtClean="0"/>
+              <a:t>In DI:</a:t>
+            </a:r>
+          </a:p>
+          <a:p>
+            <a:pPr lvl="1"/>
             <a:r>
               <a:rPr lang="en-US" dirty="0"/>
-              <a:t>controller named </a:t>
-            </a:r>
-            <a:r>
-              <a:rPr lang="en-US" dirty="0" err="1" smtClean="0"/>
-              <a:t>DispatcherServlet</a:t>
-            </a:r>
-            <a:r>
-              <a:rPr lang="en-US" dirty="0" smtClean="0"/>
-              <a:t> </a:t>
-            </a:r>
-            <a:r>
-              <a:rPr lang="en-US" dirty="0" smtClean="0"/>
-              <a:t>that </a:t>
+              <a:t>Container </a:t>
+            </a:r>
+            <a:r>
+              <a:rPr lang="en-US" dirty="0" smtClean="0"/>
+              <a:t>injects dependencies to objects.</a:t>
+            </a:r>
+            <a:endParaRPr lang="en-US" dirty="0" smtClean="0"/>
+          </a:p>
+          <a:p>
+            <a:pPr lvl="1"/>
+            <a:r>
+              <a:rPr lang="en-US" dirty="0" smtClean="0"/>
+              <a:t>Low-level </a:t>
             </a:r>
             <a:r>
               <a:rPr lang="en-US" dirty="0"/>
-              <a:t>dispatches requests to </a:t>
-            </a:r>
-            <a:r>
-              <a:rPr lang="en-US" dirty="0" smtClean="0"/>
-              <a:t>handlers.</a:t>
-            </a:r>
-          </a:p>
-          <a:p>
-            <a:endParaRPr lang="en-US" dirty="0"/>
+              <a:t>modules (class) will be injected to high-level modules (</a:t>
+            </a:r>
+            <a:r>
+              <a:rPr lang="en-US" dirty="0" smtClean="0"/>
+              <a:t>interface</a:t>
+            </a:r>
+            <a:r>
+              <a:rPr lang="en-US" dirty="0" smtClean="0"/>
+              <a:t>).</a:t>
+            </a:r>
+            <a:endParaRPr lang="en-US" dirty="0" smtClean="0"/>
           </a:p>
         </p:txBody>
       </p:sp>
@@ -6624,57 +7069,17 @@
           <a:lstStyle/>
           <a:p>
             <a:r>
-              <a:rPr lang="en-US" dirty="0"/>
-              <a:t>Spring MVC</a:t>
-            </a:r>
-          </a:p>
-        </p:txBody>
-      </p:sp>
-      <p:pic>
-        <p:nvPicPr>
-          <p:cNvPr id="5123" name="Picture 3" descr="C:\Users\HuanPM\Desktop\mvc-architecture-12-638.jpg"/>
-          <p:cNvPicPr>
-            <a:picLocks noChangeAspect="1" noChangeArrowheads="1"/>
-          </p:cNvPicPr>
-          <p:nvPr/>
-        </p:nvPicPr>
-        <p:blipFill>
-          <a:blip r:embed="rId2">
-            <a:extLst>
-              <a:ext uri="{28A0092B-C50C-407E-A947-70E740481C1C}">
-                <a14:useLocalDpi xmlns:a14="http://schemas.microsoft.com/office/drawing/2010/main" val="0"/>
-              </a:ext>
-            </a:extLst>
-          </a:blip>
-          <a:srcRect/>
-          <a:stretch>
-            <a:fillRect/>
-          </a:stretch>
-        </p:blipFill>
-        <p:spPr bwMode="auto">
-          <a:xfrm>
-            <a:off x="2421431" y="2667000"/>
-            <a:ext cx="5893623" cy="3657600"/>
-          </a:xfrm>
-          <a:prstGeom prst="rect">
-            <a:avLst/>
-          </a:prstGeom>
-          <a:noFill/>
-          <a:extLst>
-            <a:ext uri="{909E8E84-426E-40DD-AFC4-6F175D3DCCD1}">
-              <a14:hiddenFill xmlns:a14="http://schemas.microsoft.com/office/drawing/2010/main">
-                <a:solidFill>
-                  <a:srgbClr val="FFFFFF"/>
-                </a:solidFill>
-              </a14:hiddenFill>
-            </a:ext>
-          </a:extLst>
-        </p:spPr>
-      </p:pic>
+              <a:rPr lang="en-US" dirty="0" smtClean="0"/>
+              <a:t>Dependency Injection</a:t>
+            </a:r>
+            <a:endParaRPr lang="en-US" dirty="0"/>
+          </a:p>
+        </p:txBody>
+      </p:sp>
     </p:spTree>
     <p:extLst>
       <p:ext uri="{BB962C8B-B14F-4D97-AF65-F5344CB8AC3E}">
-        <p14:creationId xmlns:p14="http://schemas.microsoft.com/office/powerpoint/2010/main" val="2450254546"/>
+        <p14:creationId xmlns:p14="http://schemas.microsoft.com/office/powerpoint/2010/main" val="3482522386"/>
       </p:ext>
     </p:extLst>
   </p:cSld>

</xml_diff>